<commit_message>
Slide with lambda expression syntax complete
</commit_message>
<xml_diff>
--- a/lambdas.pptx
+++ b/lambdas.pptx
@@ -2,11 +2,12 @@
 <file path=ppt/presentation.xml><?xml version="1.0" encoding="utf-8"?>
 <p:presentation xmlns:a="http://schemas.openxmlformats.org/drawingml/2006/main" xmlns:r="http://schemas.openxmlformats.org/officeDocument/2006/relationships" xmlns:p="http://schemas.openxmlformats.org/presentationml/2006/main" saveSubsetFonts="1">
   <p:sldMasterIdLst>
-    <p:sldMasterId id="2147483648" r:id="rId1"/>
+    <p:sldMasterId id="2147483768" r:id="rId1"/>
   </p:sldMasterIdLst>
   <p:sldIdLst>
     <p:sldId id="256" r:id="rId2"/>
     <p:sldId id="257" r:id="rId3"/>
+    <p:sldId id="258" r:id="rId4"/>
   </p:sldIdLst>
   <p:sldSz cx="9144000" cy="6858000" type="screen4x3"/>
   <p:notesSz cx="6858000" cy="9144000"/>
@@ -2778,17 +2779,17 @@
   </p:cSld>
   <p:clrMap bg1="lt1" tx1="dk1" bg2="lt2" tx2="dk2" accent1="accent1" accent2="accent2" accent3="accent3" accent4="accent4" accent5="accent5" accent6="accent6" hlink="hlink" folHlink="folHlink"/>
   <p:sldLayoutIdLst>
-    <p:sldLayoutId id="2147483649" r:id="rId1"/>
-    <p:sldLayoutId id="2147483650" r:id="rId2"/>
-    <p:sldLayoutId id="2147483651" r:id="rId3"/>
-    <p:sldLayoutId id="2147483652" r:id="rId4"/>
-    <p:sldLayoutId id="2147483653" r:id="rId5"/>
-    <p:sldLayoutId id="2147483654" r:id="rId6"/>
-    <p:sldLayoutId id="2147483655" r:id="rId7"/>
-    <p:sldLayoutId id="2147483656" r:id="rId8"/>
-    <p:sldLayoutId id="2147483657" r:id="rId9"/>
-    <p:sldLayoutId id="2147483658" r:id="rId10"/>
-    <p:sldLayoutId id="2147483659" r:id="rId11"/>
+    <p:sldLayoutId id="2147483769" r:id="rId1"/>
+    <p:sldLayoutId id="2147483770" r:id="rId2"/>
+    <p:sldLayoutId id="2147483771" r:id="rId3"/>
+    <p:sldLayoutId id="2147483772" r:id="rId4"/>
+    <p:sldLayoutId id="2147483773" r:id="rId5"/>
+    <p:sldLayoutId id="2147483774" r:id="rId6"/>
+    <p:sldLayoutId id="2147483775" r:id="rId7"/>
+    <p:sldLayoutId id="2147483776" r:id="rId8"/>
+    <p:sldLayoutId id="2147483777" r:id="rId9"/>
+    <p:sldLayoutId id="2147483778" r:id="rId10"/>
+    <p:sldLayoutId id="2147483779" r:id="rId11"/>
   </p:sldLayoutIdLst>
   <p:txStyles>
     <p:titleStyle>
@@ -3222,19 +3223,7 @@
           <a:p>
             <a:r>
               <a:rPr lang="en-US" b="1" dirty="0" smtClean="0"/>
-              <a:t>Why use </a:t>
-            </a:r>
-            <a:r>
-              <a:rPr lang="en-US" b="1" dirty="0" smtClean="0"/>
-              <a:t>L</a:t>
-            </a:r>
-            <a:r>
-              <a:rPr lang="en-US" b="1" dirty="0" smtClean="0"/>
-              <a:t>ambda </a:t>
-            </a:r>
-            <a:r>
-              <a:rPr lang="en-US" b="1" dirty="0" smtClean="0"/>
-              <a:t>Expression?</a:t>
+              <a:t>Why use Lambda Expression?</a:t>
             </a:r>
             <a:endParaRPr lang="uk-UA" dirty="0"/>
           </a:p>
@@ -3304,27 +3293,7 @@
                   </a:schemeClr>
                 </a:solidFill>
               </a:rPr>
-              <a:t>n </a:t>
-            </a:r>
-            <a:r>
-              <a:rPr lang="en-US" dirty="0" smtClean="0">
-                <a:solidFill>
-                  <a:schemeClr val="bg1">
-                    <a:lumMod val="50000"/>
-                  </a:schemeClr>
-                </a:solidFill>
-              </a:rPr>
-              <a:t>interface which has only one abstract method is called </a:t>
-            </a:r>
-            <a:r>
-              <a:rPr lang="en-US" dirty="0" smtClean="0">
-                <a:solidFill>
-                  <a:schemeClr val="bg1">
-                    <a:lumMod val="50000"/>
-                  </a:schemeClr>
-                </a:solidFill>
-              </a:rPr>
-              <a:t>functional</a:t>
+              <a:t>n interface which has only one abstract method is called functional</a:t>
             </a:r>
             <a:r>
               <a:rPr lang="ru-RU" dirty="0" smtClean="0">
@@ -3384,6 +3353,189 @@
               <a:buNone/>
             </a:pPr>
             <a:endParaRPr lang="uk-UA" dirty="0"/>
+          </a:p>
+        </p:txBody>
+      </p:sp>
+    </p:spTree>
+  </p:cSld>
+  <p:clrMapOvr>
+    <a:masterClrMapping/>
+  </p:clrMapOvr>
+</p:sld>
+</file>
+
+<file path=ppt/slides/slide3.xml><?xml version="1.0" encoding="utf-8"?>
+<p:sld xmlns:a="http://schemas.openxmlformats.org/drawingml/2006/main" xmlns:r="http://schemas.openxmlformats.org/officeDocument/2006/relationships" xmlns:p="http://schemas.openxmlformats.org/presentationml/2006/main">
+  <p:cSld>
+    <p:spTree>
+      <p:nvGrpSpPr>
+        <p:cNvPr id="1" name=""/>
+        <p:cNvGrpSpPr/>
+        <p:nvPr/>
+      </p:nvGrpSpPr>
+      <p:grpSpPr>
+        <a:xfrm>
+          <a:off x="0" y="0"/>
+          <a:ext cx="0" cy="0"/>
+          <a:chOff x="0" y="0"/>
+          <a:chExt cx="0" cy="0"/>
+        </a:xfrm>
+      </p:grpSpPr>
+      <p:sp>
+        <p:nvSpPr>
+          <p:cNvPr id="2" name="Заголовок 1"/>
+          <p:cNvSpPr>
+            <a:spLocks noGrp="1"/>
+          </p:cNvSpPr>
+          <p:nvPr>
+            <p:ph type="title"/>
+          </p:nvPr>
+        </p:nvSpPr>
+        <p:spPr/>
+        <p:txBody>
+          <a:bodyPr/>
+          <a:lstStyle/>
+          <a:p>
+            <a:r>
+              <a:rPr lang="en-US" b="1" dirty="0" smtClean="0"/>
+              <a:t>Lambda Expression Syntax</a:t>
+            </a:r>
+            <a:endParaRPr lang="uk-UA" dirty="0"/>
+          </a:p>
+        </p:txBody>
+      </p:sp>
+      <p:sp>
+        <p:nvSpPr>
+          <p:cNvPr id="3" name="Содержимое 2"/>
+          <p:cNvSpPr>
+            <a:spLocks noGrp="1"/>
+          </p:cNvSpPr>
+          <p:nvPr>
+            <p:ph idx="1"/>
+          </p:nvPr>
+        </p:nvSpPr>
+        <p:spPr>
+          <a:xfrm>
+            <a:off x="500034" y="2357430"/>
+            <a:ext cx="8229600" cy="4143380"/>
+          </a:xfrm>
+          <a:ln>
+            <a:noFill/>
+          </a:ln>
+        </p:spPr>
+        <p:txBody>
+          <a:bodyPr/>
+          <a:lstStyle/>
+          <a:p>
+            <a:pPr marL="514350" indent="-514350">
+              <a:buFont typeface="+mj-lt"/>
+              <a:buAutoNum type="arabicPeriod"/>
+            </a:pPr>
+            <a:endParaRPr lang="en-US" dirty="0"/>
+          </a:p>
+          <a:p>
+            <a:pPr marL="514350" indent="-514350">
+              <a:buFont typeface="+mj-lt"/>
+              <a:buAutoNum type="arabicPeriod"/>
+            </a:pPr>
+            <a:r>
+              <a:rPr lang="en-US" b="1" dirty="0"/>
+              <a:t>Argument-list:</a:t>
+            </a:r>
+            <a:r>
+              <a:rPr lang="en-US" dirty="0"/>
+              <a:t> It can be empty or non-empty as </a:t>
+            </a:r>
+            <a:r>
+              <a:rPr lang="en-US" dirty="0" smtClean="0"/>
+              <a:t>well</a:t>
+            </a:r>
+          </a:p>
+          <a:p>
+            <a:pPr marL="514350" indent="-514350">
+              <a:buFont typeface="+mj-lt"/>
+              <a:buAutoNum type="arabicPeriod"/>
+            </a:pPr>
+            <a:r>
+              <a:rPr lang="en-US" b="1" dirty="0"/>
+              <a:t>Arrow-token:</a:t>
+            </a:r>
+            <a:r>
+              <a:rPr lang="en-US" dirty="0"/>
+              <a:t> It is used to link arguments-list and body of </a:t>
+            </a:r>
+            <a:r>
+              <a:rPr lang="en-US" dirty="0" smtClean="0"/>
+              <a:t>expression</a:t>
+            </a:r>
+          </a:p>
+          <a:p>
+            <a:pPr marL="514350" indent="-514350">
+              <a:buFont typeface="+mj-lt"/>
+              <a:buAutoNum type="arabicPeriod"/>
+            </a:pPr>
+            <a:r>
+              <a:rPr lang="en-US" b="1" dirty="0"/>
+              <a:t>Body:</a:t>
+            </a:r>
+            <a:r>
+              <a:rPr lang="en-US" dirty="0"/>
+              <a:t> It contains expressions and statements for lambda expression.</a:t>
+            </a:r>
+            <a:endParaRPr lang="en-US" dirty="0" smtClean="0"/>
+          </a:p>
+        </p:txBody>
+      </p:sp>
+      <p:sp useBgFill="1">
+        <p:nvSpPr>
+          <p:cNvPr id="14" name="Скругленный прямоугольник 13"/>
+          <p:cNvSpPr/>
+          <p:nvPr/>
+        </p:nvSpPr>
+        <p:spPr>
+          <a:xfrm>
+            <a:off x="1571604" y="1428736"/>
+            <a:ext cx="6072230" cy="1214446"/>
+          </a:xfrm>
+          <a:prstGeom prst="roundRect">
+            <a:avLst/>
+          </a:prstGeom>
+          <a:ln w="73025"/>
+        </p:spPr>
+        <p:style>
+          <a:lnRef idx="2">
+            <a:schemeClr val="accent3">
+              <a:shade val="50000"/>
+            </a:schemeClr>
+          </a:lnRef>
+          <a:fillRef idx="1">
+            <a:schemeClr val="accent3"/>
+          </a:fillRef>
+          <a:effectRef idx="0">
+            <a:schemeClr val="accent3"/>
+          </a:effectRef>
+          <a:fontRef idx="minor">
+            <a:schemeClr val="lt1"/>
+          </a:fontRef>
+        </p:style>
+        <p:txBody>
+          <a:bodyPr rtlCol="0" anchor="ctr"/>
+          <a:lstStyle/>
+          <a:p>
+            <a:pPr algn="ctr"/>
+            <a:r>
+              <a:rPr lang="en-US" sz="4000" dirty="0" smtClean="0">
+                <a:solidFill>
+                  <a:schemeClr val="tx1"/>
+                </a:solidFill>
+              </a:rPr>
+              <a:t>(argument-list) -&gt; {body}</a:t>
+            </a:r>
+            <a:endParaRPr lang="uk-UA" sz="4000" dirty="0">
+              <a:solidFill>
+                <a:schemeClr val="tx1"/>
+              </a:solidFill>
+            </a:endParaRPr>
           </a:p>
         </p:txBody>
       </p:sp>

</xml_diff>

<commit_message>
Three slides with examples added
</commit_message>
<xml_diff>
--- a/lambdas.pptx
+++ b/lambdas.pptx
@@ -8,6 +8,9 @@
     <p:sldId id="256" r:id="rId2"/>
     <p:sldId id="257" r:id="rId3"/>
     <p:sldId id="258" r:id="rId4"/>
+    <p:sldId id="261" r:id="rId5"/>
+    <p:sldId id="259" r:id="rId6"/>
+    <p:sldId id="260" r:id="rId7"/>
   </p:sldIdLst>
   <p:sldSz cx="9144000" cy="6858000" type="screen4x3"/>
   <p:notesSz cx="6858000" cy="9144000"/>
@@ -3536,6 +3539,1328 @@
                 <a:schemeClr val="tx1"/>
               </a:solidFill>
             </a:endParaRPr>
+          </a:p>
+        </p:txBody>
+      </p:sp>
+    </p:spTree>
+  </p:cSld>
+  <p:clrMapOvr>
+    <a:masterClrMapping/>
+  </p:clrMapOvr>
+</p:sld>
+</file>
+
+<file path=ppt/slides/slide4.xml><?xml version="1.0" encoding="utf-8"?>
+<p:sld xmlns:a="http://schemas.openxmlformats.org/drawingml/2006/main" xmlns:r="http://schemas.openxmlformats.org/officeDocument/2006/relationships" xmlns:p="http://schemas.openxmlformats.org/presentationml/2006/main">
+  <p:cSld>
+    <p:spTree>
+      <p:nvGrpSpPr>
+        <p:cNvPr id="1" name=""/>
+        <p:cNvGrpSpPr/>
+        <p:nvPr/>
+      </p:nvGrpSpPr>
+      <p:grpSpPr>
+        <a:xfrm>
+          <a:off x="0" y="0"/>
+          <a:ext cx="0" cy="0"/>
+          <a:chOff x="0" y="0"/>
+          <a:chExt cx="0" cy="0"/>
+        </a:xfrm>
+      </p:grpSpPr>
+      <p:sp>
+        <p:nvSpPr>
+          <p:cNvPr id="2" name="Заголовок 1"/>
+          <p:cNvSpPr>
+            <a:spLocks noGrp="1"/>
+          </p:cNvSpPr>
+          <p:nvPr>
+            <p:ph type="title"/>
+          </p:nvPr>
+        </p:nvSpPr>
+        <p:spPr/>
+        <p:txBody>
+          <a:bodyPr>
+            <a:normAutofit fontScale="90000"/>
+          </a:bodyPr>
+          <a:lstStyle/>
+          <a:p>
+            <a:r>
+              <a:rPr lang="en-US" b="1" dirty="0"/>
+              <a:t>The following are examples of Java lambda expressions</a:t>
+            </a:r>
+            <a:r>
+              <a:rPr lang="en-US" dirty="0"/>
+              <a:t>:</a:t>
+            </a:r>
+            <a:endParaRPr lang="uk-UA" dirty="0"/>
+          </a:p>
+        </p:txBody>
+      </p:sp>
+      <p:sp>
+        <p:nvSpPr>
+          <p:cNvPr id="3" name="Содержимое 2"/>
+          <p:cNvSpPr>
+            <a:spLocks noGrp="1"/>
+          </p:cNvSpPr>
+          <p:nvPr>
+            <p:ph idx="1"/>
+          </p:nvPr>
+        </p:nvSpPr>
+        <p:spPr/>
+        <p:style>
+          <a:lnRef idx="1">
+            <a:schemeClr val="dk1"/>
+          </a:lnRef>
+          <a:fillRef idx="2">
+            <a:schemeClr val="dk1"/>
+          </a:fillRef>
+          <a:effectRef idx="1">
+            <a:schemeClr val="dk1"/>
+          </a:effectRef>
+          <a:fontRef idx="minor">
+            <a:schemeClr val="dk1"/>
+          </a:fontRef>
+        </p:style>
+        <p:txBody>
+          <a:bodyPr>
+            <a:normAutofit fontScale="92500" lnSpcReduction="20000"/>
+          </a:bodyPr>
+          <a:lstStyle/>
+          <a:p>
+            <a:pPr marL="514350" indent="-514350"/>
+            <a:r>
+              <a:rPr lang="uk-UA" sz="2800" dirty="0" smtClean="0">
+                <a:latin typeface="+mj-lt"/>
+                <a:cs typeface="Arial" pitchFamily="34" charset="0"/>
+              </a:rPr>
+              <a:t>(</a:t>
+            </a:r>
+            <a:r>
+              <a:rPr lang="uk-UA" sz="2800" b="0" i="1" dirty="0" smtClean="0">
+                <a:latin typeface="+mj-lt"/>
+                <a:cs typeface="Arial" pitchFamily="34" charset="0"/>
+              </a:rPr>
+              <a:t>) -&gt; 5 </a:t>
+            </a:r>
+          </a:p>
+          <a:p>
+            <a:pPr marL="514350" indent="-514350">
+              <a:buNone/>
+            </a:pPr>
+            <a:r>
+              <a:rPr lang="en-US" sz="2800" dirty="0" smtClean="0">
+                <a:solidFill>
+                  <a:srgbClr val="00B050"/>
+                </a:solidFill>
+              </a:rPr>
+              <a:t>// takes no value and returns 5</a:t>
+            </a:r>
+            <a:endParaRPr lang="ru-RU" sz="2800" dirty="0" smtClean="0">
+              <a:solidFill>
+                <a:srgbClr val="00B050"/>
+              </a:solidFill>
+            </a:endParaRPr>
+          </a:p>
+          <a:p>
+            <a:pPr marL="514350" indent="-514350">
+              <a:buNone/>
+            </a:pPr>
+            <a:endParaRPr lang="en-US" sz="2800" i="1" dirty="0">
+              <a:latin typeface="+mj-lt"/>
+              <a:cs typeface="Arial" pitchFamily="34" charset="0"/>
+            </a:endParaRPr>
+          </a:p>
+          <a:p>
+            <a:pPr marL="514350" indent="-514350"/>
+            <a:r>
+              <a:rPr lang="en-US" sz="2800" dirty="0" smtClean="0"/>
+              <a:t>x -&gt; 2 * x </a:t>
+            </a:r>
+          </a:p>
+          <a:p>
+            <a:pPr marL="514350" indent="-514350">
+              <a:buNone/>
+            </a:pPr>
+            <a:r>
+              <a:rPr lang="en-US" sz="2800" dirty="0" smtClean="0">
+                <a:solidFill>
+                  <a:srgbClr val="00B050"/>
+                </a:solidFill>
+              </a:rPr>
+              <a:t>// takes a number and returns the result of doubling it</a:t>
+            </a:r>
+            <a:endParaRPr lang="ru-RU" sz="2800" dirty="0" smtClean="0">
+              <a:solidFill>
+                <a:srgbClr val="00B050"/>
+              </a:solidFill>
+            </a:endParaRPr>
+          </a:p>
+          <a:p>
+            <a:pPr marL="514350" indent="-514350">
+              <a:buNone/>
+            </a:pPr>
+            <a:endParaRPr lang="en-US" sz="2800" dirty="0" smtClean="0">
+              <a:solidFill>
+                <a:srgbClr val="00B050"/>
+              </a:solidFill>
+            </a:endParaRPr>
+          </a:p>
+          <a:p>
+            <a:pPr marL="514350" indent="-514350"/>
+            <a:r>
+              <a:rPr lang="en-US" sz="2800" dirty="0" smtClean="0"/>
+              <a:t>(</a:t>
+            </a:r>
+            <a:r>
+              <a:rPr lang="en-US" sz="2800" b="0" i="1" dirty="0" smtClean="0"/>
+              <a:t>x, y) -&gt; x – y </a:t>
+            </a:r>
+          </a:p>
+          <a:p>
+            <a:pPr marL="514350" indent="-514350">
+              <a:buNone/>
+            </a:pPr>
+            <a:r>
+              <a:rPr lang="en-US" sz="2800" dirty="0" smtClean="0">
+                <a:solidFill>
+                  <a:srgbClr val="00B050"/>
+                </a:solidFill>
+              </a:rPr>
+              <a:t>// takes two numbers and returns their difference</a:t>
+            </a:r>
+            <a:endParaRPr lang="ru-RU" sz="2800" dirty="0" smtClean="0">
+              <a:solidFill>
+                <a:srgbClr val="00B050"/>
+              </a:solidFill>
+            </a:endParaRPr>
+          </a:p>
+          <a:p>
+            <a:pPr marL="514350" indent="-514350">
+              <a:buNone/>
+            </a:pPr>
+            <a:endParaRPr lang="en-US" sz="2800" dirty="0" smtClean="0"/>
+          </a:p>
+          <a:p>
+            <a:pPr marL="514350" indent="-514350"/>
+            <a:r>
+              <a:rPr lang="en-US" sz="2800" dirty="0" smtClean="0"/>
+              <a:t>(</a:t>
+            </a:r>
+            <a:r>
+              <a:rPr lang="en-US" sz="2800" b="0" i="1" dirty="0" smtClean="0"/>
+              <a:t>String s) -&gt; System.out.print(s) </a:t>
+            </a:r>
+            <a:endParaRPr lang="ru-RU" sz="2800" b="0" i="1" dirty="0" smtClean="0"/>
+          </a:p>
+          <a:p>
+            <a:pPr marL="514350" indent="-514350">
+              <a:buNone/>
+            </a:pPr>
+            <a:r>
+              <a:rPr lang="en-US" sz="2800" dirty="0" smtClean="0">
+                <a:solidFill>
+                  <a:srgbClr val="00B050"/>
+                </a:solidFill>
+              </a:rPr>
+              <a:t>// takes a string and prints it to console</a:t>
+            </a:r>
+            <a:endParaRPr lang="uk-UA" sz="2800" dirty="0">
+              <a:solidFill>
+                <a:srgbClr val="00B050"/>
+              </a:solidFill>
+              <a:latin typeface="+mj-lt"/>
+              <a:cs typeface="Arial" pitchFamily="34" charset="0"/>
+            </a:endParaRPr>
+          </a:p>
+        </p:txBody>
+      </p:sp>
+    </p:spTree>
+  </p:cSld>
+  <p:clrMapOvr>
+    <a:masterClrMapping/>
+  </p:clrMapOvr>
+</p:sld>
+</file>
+
+<file path=ppt/slides/slide5.xml><?xml version="1.0" encoding="utf-8"?>
+<p:sld xmlns:a="http://schemas.openxmlformats.org/drawingml/2006/main" xmlns:r="http://schemas.openxmlformats.org/officeDocument/2006/relationships" xmlns:p="http://schemas.openxmlformats.org/presentationml/2006/main">
+  <p:cSld>
+    <p:spTree>
+      <p:nvGrpSpPr>
+        <p:cNvPr id="1" name=""/>
+        <p:cNvGrpSpPr/>
+        <p:nvPr/>
+      </p:nvGrpSpPr>
+      <p:grpSpPr>
+        <a:xfrm>
+          <a:off x="0" y="0"/>
+          <a:ext cx="0" cy="0"/>
+          <a:chOff x="0" y="0"/>
+          <a:chExt cx="0" cy="0"/>
+        </a:xfrm>
+      </p:grpSpPr>
+      <p:sp>
+        <p:nvSpPr>
+          <p:cNvPr id="4" name="Заголовок 3"/>
+          <p:cNvSpPr>
+            <a:spLocks noGrp="1"/>
+          </p:cNvSpPr>
+          <p:nvPr>
+            <p:ph type="title"/>
+          </p:nvPr>
+        </p:nvSpPr>
+        <p:spPr/>
+        <p:txBody>
+          <a:bodyPr>
+            <a:normAutofit/>
+          </a:bodyPr>
+          <a:lstStyle/>
+          <a:p>
+            <a:r>
+              <a:rPr lang="en-US" sz="2600" i="1" dirty="0"/>
+              <a:t>Let's see </a:t>
+            </a:r>
+            <a:r>
+              <a:rPr lang="en-US" sz="2600" i="1" dirty="0" smtClean="0"/>
+              <a:t>an example. We </a:t>
+            </a:r>
+            <a:r>
+              <a:rPr lang="en-US" sz="2600" i="1" dirty="0"/>
+              <a:t>are implementing an interface </a:t>
+            </a:r>
+            <a:r>
+              <a:rPr lang="en-US" sz="2600" i="1" dirty="0" smtClean="0"/>
+              <a:t>method both without and with </a:t>
+            </a:r>
+            <a:r>
+              <a:rPr lang="en-US" sz="2600" i="1" dirty="0"/>
+              <a:t>using lambda expression.</a:t>
+            </a:r>
+            <a:endParaRPr lang="uk-UA" sz="2600" i="1" dirty="0"/>
+          </a:p>
+        </p:txBody>
+      </p:sp>
+      <p:sp>
+        <p:nvSpPr>
+          <p:cNvPr id="5" name="Текст 4"/>
+          <p:cNvSpPr>
+            <a:spLocks noGrp="1"/>
+          </p:cNvSpPr>
+          <p:nvPr>
+            <p:ph type="body" idx="1"/>
+          </p:nvPr>
+        </p:nvSpPr>
+        <p:spPr>
+          <a:xfrm>
+            <a:off x="2643174" y="1285860"/>
+            <a:ext cx="4040188" cy="639762"/>
+          </a:xfrm>
+        </p:spPr>
+        <p:txBody>
+          <a:bodyPr/>
+          <a:lstStyle/>
+          <a:p>
+            <a:pPr algn="ctr"/>
+            <a:r>
+              <a:rPr lang="en-US" dirty="0" smtClean="0">
+                <a:solidFill>
+                  <a:srgbClr val="7030A0"/>
+                </a:solidFill>
+              </a:rPr>
+              <a:t>Without lambda expression</a:t>
+            </a:r>
+            <a:endParaRPr lang="uk-UA" dirty="0">
+              <a:solidFill>
+                <a:srgbClr val="7030A0"/>
+              </a:solidFill>
+            </a:endParaRPr>
+          </a:p>
+        </p:txBody>
+      </p:sp>
+      <p:sp>
+        <p:nvSpPr>
+          <p:cNvPr id="6" name="Содержимое 5"/>
+          <p:cNvSpPr>
+            <a:spLocks noGrp="1"/>
+          </p:cNvSpPr>
+          <p:nvPr>
+            <p:ph sz="half" idx="2"/>
+          </p:nvPr>
+        </p:nvSpPr>
+        <p:spPr>
+          <a:xfrm>
+            <a:off x="428596" y="2000240"/>
+            <a:ext cx="8215370" cy="4572032"/>
+          </a:xfrm>
+        </p:spPr>
+        <p:style>
+          <a:lnRef idx="1">
+            <a:schemeClr val="dk1"/>
+          </a:lnRef>
+          <a:fillRef idx="2">
+            <a:schemeClr val="dk1"/>
+          </a:fillRef>
+          <a:effectRef idx="1">
+            <a:schemeClr val="dk1"/>
+          </a:effectRef>
+          <a:fontRef idx="minor">
+            <a:schemeClr val="dk1"/>
+          </a:fontRef>
+        </p:style>
+        <p:txBody>
+          <a:bodyPr>
+            <a:normAutofit fontScale="77500" lnSpcReduction="20000"/>
+          </a:bodyPr>
+          <a:lstStyle/>
+          <a:p>
+            <a:pPr>
+              <a:buNone/>
+            </a:pPr>
+            <a:endParaRPr lang="ru-RU" b="1" dirty="0" smtClean="0">
+              <a:latin typeface="Arial" pitchFamily="34" charset="0"/>
+              <a:cs typeface="Arial" pitchFamily="34" charset="0"/>
+            </a:endParaRPr>
+          </a:p>
+          <a:p>
+            <a:pPr>
+              <a:buNone/>
+            </a:pPr>
+            <a:r>
+              <a:rPr lang="en-US" b="1" dirty="0" smtClean="0">
+                <a:latin typeface="Arial" pitchFamily="34" charset="0"/>
+                <a:cs typeface="Arial" pitchFamily="34" charset="0"/>
+              </a:rPr>
+              <a:t>interface</a:t>
+            </a:r>
+            <a:r>
+              <a:rPr lang="en-US" dirty="0">
+                <a:latin typeface="Arial" pitchFamily="34" charset="0"/>
+                <a:cs typeface="Arial" pitchFamily="34" charset="0"/>
+              </a:rPr>
+              <a:t> Drawable{  </a:t>
+            </a:r>
+          </a:p>
+          <a:p>
+            <a:pPr>
+              <a:buNone/>
+            </a:pPr>
+            <a:r>
+              <a:rPr lang="en-US" b="1" dirty="0" smtClean="0">
+                <a:latin typeface="Arial" pitchFamily="34" charset="0"/>
+                <a:cs typeface="Arial" pitchFamily="34" charset="0"/>
+              </a:rPr>
+              <a:t>	public</a:t>
+            </a:r>
+            <a:r>
+              <a:rPr lang="en-US" dirty="0">
+                <a:latin typeface="Arial" pitchFamily="34" charset="0"/>
+                <a:cs typeface="Arial" pitchFamily="34" charset="0"/>
+              </a:rPr>
+              <a:t> </a:t>
+            </a:r>
+            <a:r>
+              <a:rPr lang="en-US" b="1" dirty="0">
+                <a:latin typeface="Arial" pitchFamily="34" charset="0"/>
+                <a:cs typeface="Arial" pitchFamily="34" charset="0"/>
+              </a:rPr>
+              <a:t>void</a:t>
+            </a:r>
+            <a:r>
+              <a:rPr lang="en-US" dirty="0">
+                <a:latin typeface="Arial" pitchFamily="34" charset="0"/>
+                <a:cs typeface="Arial" pitchFamily="34" charset="0"/>
+              </a:rPr>
+              <a:t> draw();  </a:t>
+            </a:r>
+          </a:p>
+          <a:p>
+            <a:pPr>
+              <a:buNone/>
+            </a:pPr>
+            <a:r>
+              <a:rPr lang="en-US" dirty="0">
+                <a:latin typeface="Arial" pitchFamily="34" charset="0"/>
+                <a:cs typeface="Arial" pitchFamily="34" charset="0"/>
+              </a:rPr>
+              <a:t>}  </a:t>
+            </a:r>
+          </a:p>
+          <a:p>
+            <a:pPr>
+              <a:buNone/>
+            </a:pPr>
+            <a:r>
+              <a:rPr lang="en-US" b="1" dirty="0">
+                <a:latin typeface="Arial" pitchFamily="34" charset="0"/>
+                <a:cs typeface="Arial" pitchFamily="34" charset="0"/>
+              </a:rPr>
+              <a:t>public</a:t>
+            </a:r>
+            <a:r>
+              <a:rPr lang="en-US" dirty="0">
+                <a:latin typeface="Arial" pitchFamily="34" charset="0"/>
+                <a:cs typeface="Arial" pitchFamily="34" charset="0"/>
+              </a:rPr>
+              <a:t> </a:t>
+            </a:r>
+            <a:r>
+              <a:rPr lang="en-US" b="1" dirty="0">
+                <a:latin typeface="Arial" pitchFamily="34" charset="0"/>
+                <a:cs typeface="Arial" pitchFamily="34" charset="0"/>
+              </a:rPr>
+              <a:t>class</a:t>
+            </a:r>
+            <a:r>
+              <a:rPr lang="en-US" dirty="0">
+                <a:latin typeface="Arial" pitchFamily="34" charset="0"/>
+                <a:cs typeface="Arial" pitchFamily="34" charset="0"/>
+              </a:rPr>
+              <a:t> LambdaExpressionExample {  </a:t>
+            </a:r>
+          </a:p>
+          <a:p>
+            <a:pPr>
+              <a:buNone/>
+            </a:pPr>
+            <a:r>
+              <a:rPr lang="en-US" dirty="0">
+                <a:latin typeface="Arial" pitchFamily="34" charset="0"/>
+                <a:cs typeface="Arial" pitchFamily="34" charset="0"/>
+              </a:rPr>
+              <a:t>    </a:t>
+            </a:r>
+            <a:r>
+              <a:rPr lang="en-US" b="1" dirty="0">
+                <a:latin typeface="Arial" pitchFamily="34" charset="0"/>
+                <a:cs typeface="Arial" pitchFamily="34" charset="0"/>
+              </a:rPr>
+              <a:t>public</a:t>
+            </a:r>
+            <a:r>
+              <a:rPr lang="en-US" dirty="0">
+                <a:latin typeface="Arial" pitchFamily="34" charset="0"/>
+                <a:cs typeface="Arial" pitchFamily="34" charset="0"/>
+              </a:rPr>
+              <a:t> </a:t>
+            </a:r>
+            <a:r>
+              <a:rPr lang="en-US" b="1" dirty="0">
+                <a:latin typeface="Arial" pitchFamily="34" charset="0"/>
+                <a:cs typeface="Arial" pitchFamily="34" charset="0"/>
+              </a:rPr>
+              <a:t>static</a:t>
+            </a:r>
+            <a:r>
+              <a:rPr lang="en-US" dirty="0">
+                <a:latin typeface="Arial" pitchFamily="34" charset="0"/>
+                <a:cs typeface="Arial" pitchFamily="34" charset="0"/>
+              </a:rPr>
+              <a:t> </a:t>
+            </a:r>
+            <a:r>
+              <a:rPr lang="en-US" b="1" dirty="0">
+                <a:latin typeface="Arial" pitchFamily="34" charset="0"/>
+                <a:cs typeface="Arial" pitchFamily="34" charset="0"/>
+              </a:rPr>
+              <a:t>void</a:t>
+            </a:r>
+            <a:r>
+              <a:rPr lang="en-US" dirty="0">
+                <a:latin typeface="Arial" pitchFamily="34" charset="0"/>
+                <a:cs typeface="Arial" pitchFamily="34" charset="0"/>
+              </a:rPr>
+              <a:t> main(String[] args) {  </a:t>
+            </a:r>
+          </a:p>
+          <a:p>
+            <a:pPr>
+              <a:buNone/>
+            </a:pPr>
+            <a:r>
+              <a:rPr lang="en-US" dirty="0">
+                <a:latin typeface="Arial" pitchFamily="34" charset="0"/>
+                <a:cs typeface="Arial" pitchFamily="34" charset="0"/>
+              </a:rPr>
+              <a:t>        </a:t>
+            </a:r>
+            <a:r>
+              <a:rPr lang="en-US" b="1" dirty="0">
+                <a:latin typeface="Arial" pitchFamily="34" charset="0"/>
+                <a:cs typeface="Arial" pitchFamily="34" charset="0"/>
+              </a:rPr>
+              <a:t>int</a:t>
+            </a:r>
+            <a:r>
+              <a:rPr lang="en-US" dirty="0">
+                <a:latin typeface="Arial" pitchFamily="34" charset="0"/>
+                <a:cs typeface="Arial" pitchFamily="34" charset="0"/>
+              </a:rPr>
+              <a:t> </a:t>
+            </a:r>
+            <a:r>
+              <a:rPr lang="en-US" dirty="0" smtClean="0">
+                <a:latin typeface="Arial" pitchFamily="34" charset="0"/>
+                <a:cs typeface="Arial" pitchFamily="34" charset="0"/>
+              </a:rPr>
+              <a:t>width = 10</a:t>
+            </a:r>
+            <a:r>
+              <a:rPr lang="en-US" dirty="0">
+                <a:latin typeface="Arial" pitchFamily="34" charset="0"/>
+                <a:cs typeface="Arial" pitchFamily="34" charset="0"/>
+              </a:rPr>
+              <a:t>;  </a:t>
+            </a:r>
+          </a:p>
+          <a:p>
+            <a:pPr>
+              <a:buNone/>
+            </a:pPr>
+            <a:r>
+              <a:rPr lang="en-US" dirty="0">
+                <a:latin typeface="Arial" pitchFamily="34" charset="0"/>
+                <a:cs typeface="Arial" pitchFamily="34" charset="0"/>
+              </a:rPr>
+              <a:t>  </a:t>
+            </a:r>
+          </a:p>
+          <a:p>
+            <a:pPr>
+              <a:buNone/>
+            </a:pPr>
+            <a:r>
+              <a:rPr lang="en-US" dirty="0">
+                <a:latin typeface="Arial" pitchFamily="34" charset="0"/>
+                <a:cs typeface="Arial" pitchFamily="34" charset="0"/>
+              </a:rPr>
+              <a:t>        </a:t>
+            </a:r>
+            <a:r>
+              <a:rPr lang="en-US" dirty="0">
+                <a:solidFill>
+                  <a:srgbClr val="00B050"/>
+                </a:solidFill>
+                <a:latin typeface="Arial" pitchFamily="34" charset="0"/>
+                <a:cs typeface="Arial" pitchFamily="34" charset="0"/>
+              </a:rPr>
+              <a:t>//without lambda, Drawable implementation using anonymous class</a:t>
+            </a:r>
+            <a:r>
+              <a:rPr lang="en-US" dirty="0">
+                <a:latin typeface="Arial" pitchFamily="34" charset="0"/>
+                <a:cs typeface="Arial" pitchFamily="34" charset="0"/>
+              </a:rPr>
+              <a:t>  </a:t>
+            </a:r>
+          </a:p>
+          <a:p>
+            <a:pPr>
+              <a:buNone/>
+            </a:pPr>
+            <a:r>
+              <a:rPr lang="en-US" dirty="0">
+                <a:latin typeface="Arial" pitchFamily="34" charset="0"/>
+                <a:cs typeface="Arial" pitchFamily="34" charset="0"/>
+              </a:rPr>
+              <a:t>        Drawable </a:t>
+            </a:r>
+            <a:r>
+              <a:rPr lang="en-US" dirty="0" smtClean="0">
+                <a:latin typeface="Arial" pitchFamily="34" charset="0"/>
+                <a:cs typeface="Arial" pitchFamily="34" charset="0"/>
+              </a:rPr>
+              <a:t>d = </a:t>
+            </a:r>
+            <a:r>
+              <a:rPr lang="en-US" b="1" dirty="0" smtClean="0">
+                <a:latin typeface="Arial" pitchFamily="34" charset="0"/>
+                <a:cs typeface="Arial" pitchFamily="34" charset="0"/>
+              </a:rPr>
+              <a:t>new</a:t>
+            </a:r>
+            <a:r>
+              <a:rPr lang="en-US" dirty="0">
+                <a:latin typeface="Arial" pitchFamily="34" charset="0"/>
+                <a:cs typeface="Arial" pitchFamily="34" charset="0"/>
+              </a:rPr>
+              <a:t> Drawable(){  </a:t>
+            </a:r>
+          </a:p>
+          <a:p>
+            <a:pPr>
+              <a:buNone/>
+            </a:pPr>
+            <a:r>
+              <a:rPr lang="en-US" dirty="0">
+                <a:latin typeface="Arial" pitchFamily="34" charset="0"/>
+                <a:cs typeface="Arial" pitchFamily="34" charset="0"/>
+              </a:rPr>
+              <a:t>            </a:t>
+            </a:r>
+            <a:r>
+              <a:rPr lang="en-US" b="1" dirty="0">
+                <a:latin typeface="Arial" pitchFamily="34" charset="0"/>
+                <a:cs typeface="Arial" pitchFamily="34" charset="0"/>
+              </a:rPr>
+              <a:t>public</a:t>
+            </a:r>
+            <a:r>
+              <a:rPr lang="en-US" dirty="0">
+                <a:latin typeface="Arial" pitchFamily="34" charset="0"/>
+                <a:cs typeface="Arial" pitchFamily="34" charset="0"/>
+              </a:rPr>
+              <a:t> </a:t>
+            </a:r>
+            <a:r>
+              <a:rPr lang="en-US" b="1" dirty="0">
+                <a:latin typeface="Arial" pitchFamily="34" charset="0"/>
+                <a:cs typeface="Arial" pitchFamily="34" charset="0"/>
+              </a:rPr>
+              <a:t>void</a:t>
+            </a:r>
+            <a:r>
+              <a:rPr lang="en-US" dirty="0">
+                <a:latin typeface="Arial" pitchFamily="34" charset="0"/>
+                <a:cs typeface="Arial" pitchFamily="34" charset="0"/>
+              </a:rPr>
+              <a:t> draw(){System.out.println("Drawing </a:t>
+            </a:r>
+            <a:r>
+              <a:rPr lang="en-US" dirty="0" smtClean="0">
+                <a:latin typeface="Arial" pitchFamily="34" charset="0"/>
+                <a:cs typeface="Arial" pitchFamily="34" charset="0"/>
+              </a:rPr>
+              <a:t>" + width</a:t>
+            </a:r>
+            <a:r>
+              <a:rPr lang="en-US" dirty="0">
+                <a:latin typeface="Arial" pitchFamily="34" charset="0"/>
+                <a:cs typeface="Arial" pitchFamily="34" charset="0"/>
+              </a:rPr>
+              <a:t>);}  </a:t>
+            </a:r>
+          </a:p>
+          <a:p>
+            <a:pPr>
+              <a:buNone/>
+            </a:pPr>
+            <a:r>
+              <a:rPr lang="en-US" dirty="0">
+                <a:latin typeface="Arial" pitchFamily="34" charset="0"/>
+                <a:cs typeface="Arial" pitchFamily="34" charset="0"/>
+              </a:rPr>
+              <a:t>        };  </a:t>
+            </a:r>
+          </a:p>
+          <a:p>
+            <a:pPr>
+              <a:buNone/>
+            </a:pPr>
+            <a:r>
+              <a:rPr lang="en-US" dirty="0">
+                <a:latin typeface="Arial" pitchFamily="34" charset="0"/>
+                <a:cs typeface="Arial" pitchFamily="34" charset="0"/>
+              </a:rPr>
+              <a:t>        d.draw();  </a:t>
+            </a:r>
+          </a:p>
+          <a:p>
+            <a:pPr>
+              <a:buNone/>
+            </a:pPr>
+            <a:r>
+              <a:rPr lang="en-US" dirty="0">
+                <a:latin typeface="Arial" pitchFamily="34" charset="0"/>
+                <a:cs typeface="Arial" pitchFamily="34" charset="0"/>
+              </a:rPr>
+              <a:t>    }  </a:t>
+            </a:r>
+          </a:p>
+          <a:p>
+            <a:pPr>
+              <a:buNone/>
+            </a:pPr>
+            <a:r>
+              <a:rPr lang="en-US" dirty="0">
+                <a:latin typeface="Arial" pitchFamily="34" charset="0"/>
+                <a:cs typeface="Arial" pitchFamily="34" charset="0"/>
+              </a:rPr>
+              <a:t>}  </a:t>
+            </a:r>
+          </a:p>
+          <a:p>
+            <a:pPr>
+              <a:buNone/>
+            </a:pPr>
+            <a:endParaRPr lang="uk-UA" dirty="0">
+              <a:latin typeface="Arial" pitchFamily="34" charset="0"/>
+              <a:cs typeface="Arial" pitchFamily="34" charset="0"/>
+            </a:endParaRPr>
+          </a:p>
+        </p:txBody>
+      </p:sp>
+    </p:spTree>
+  </p:cSld>
+  <p:clrMapOvr>
+    <a:masterClrMapping/>
+  </p:clrMapOvr>
+</p:sld>
+</file>
+
+<file path=ppt/slides/slide6.xml><?xml version="1.0" encoding="utf-8"?>
+<p:sld xmlns:a="http://schemas.openxmlformats.org/drawingml/2006/main" xmlns:r="http://schemas.openxmlformats.org/officeDocument/2006/relationships" xmlns:p="http://schemas.openxmlformats.org/presentationml/2006/main">
+  <p:cSld>
+    <p:spTree>
+      <p:nvGrpSpPr>
+        <p:cNvPr id="1" name=""/>
+        <p:cNvGrpSpPr/>
+        <p:nvPr/>
+      </p:nvGrpSpPr>
+      <p:grpSpPr>
+        <a:xfrm>
+          <a:off x="0" y="0"/>
+          <a:ext cx="0" cy="0"/>
+          <a:chOff x="0" y="0"/>
+          <a:chExt cx="0" cy="0"/>
+        </a:xfrm>
+      </p:grpSpPr>
+      <p:sp>
+        <p:nvSpPr>
+          <p:cNvPr id="5" name="Текст 4"/>
+          <p:cNvSpPr>
+            <a:spLocks noGrp="1"/>
+          </p:cNvSpPr>
+          <p:nvPr>
+            <p:ph type="body" idx="1"/>
+          </p:nvPr>
+        </p:nvSpPr>
+        <p:spPr>
+          <a:xfrm>
+            <a:off x="2643174" y="571480"/>
+            <a:ext cx="4040188" cy="639762"/>
+          </a:xfrm>
+        </p:spPr>
+        <p:txBody>
+          <a:bodyPr/>
+          <a:lstStyle/>
+          <a:p>
+            <a:pPr algn="ctr"/>
+            <a:r>
+              <a:rPr lang="en-US" dirty="0" smtClean="0">
+                <a:solidFill>
+                  <a:srgbClr val="7030A0"/>
+                </a:solidFill>
+              </a:rPr>
+              <a:t>With lambda expression</a:t>
+            </a:r>
+            <a:endParaRPr lang="uk-UA" dirty="0">
+              <a:solidFill>
+                <a:srgbClr val="7030A0"/>
+              </a:solidFill>
+            </a:endParaRPr>
+          </a:p>
+        </p:txBody>
+      </p:sp>
+      <p:sp>
+        <p:nvSpPr>
+          <p:cNvPr id="6" name="Содержимое 5"/>
+          <p:cNvSpPr>
+            <a:spLocks noGrp="1"/>
+          </p:cNvSpPr>
+          <p:nvPr>
+            <p:ph sz="half" idx="2"/>
+          </p:nvPr>
+        </p:nvSpPr>
+        <p:spPr>
+          <a:xfrm>
+            <a:off x="428596" y="1428736"/>
+            <a:ext cx="8215370" cy="5143536"/>
+          </a:xfrm>
+        </p:spPr>
+        <p:style>
+          <a:lnRef idx="1">
+            <a:schemeClr val="dk1"/>
+          </a:lnRef>
+          <a:fillRef idx="2">
+            <a:schemeClr val="dk1"/>
+          </a:fillRef>
+          <a:effectRef idx="1">
+            <a:schemeClr val="dk1"/>
+          </a:effectRef>
+          <a:fontRef idx="minor">
+            <a:schemeClr val="dk1"/>
+          </a:fontRef>
+        </p:style>
+        <p:txBody>
+          <a:bodyPr>
+            <a:normAutofit fontScale="77500" lnSpcReduction="20000"/>
+          </a:bodyPr>
+          <a:lstStyle/>
+          <a:p>
+            <a:pPr>
+              <a:buNone/>
+            </a:pPr>
+            <a:endParaRPr lang="ru-RU" dirty="0" smtClean="0">
+              <a:latin typeface="Arial" pitchFamily="34" charset="0"/>
+              <a:cs typeface="Arial" pitchFamily="34" charset="0"/>
+            </a:endParaRPr>
+          </a:p>
+          <a:p>
+            <a:pPr>
+              <a:buNone/>
+            </a:pPr>
+            <a:r>
+              <a:rPr lang="en-US" dirty="0" smtClean="0">
+                <a:solidFill>
+                  <a:schemeClr val="bg1">
+                    <a:lumMod val="50000"/>
+                  </a:schemeClr>
+                </a:solidFill>
+                <a:latin typeface="Arial" pitchFamily="34" charset="0"/>
+                <a:cs typeface="Arial" pitchFamily="34" charset="0"/>
+              </a:rPr>
+              <a:t>@</a:t>
+            </a:r>
+            <a:r>
+              <a:rPr lang="en-US" dirty="0">
+                <a:solidFill>
+                  <a:schemeClr val="bg1">
+                    <a:lumMod val="50000"/>
+                  </a:schemeClr>
+                </a:solidFill>
+                <a:latin typeface="Arial" pitchFamily="34" charset="0"/>
+                <a:cs typeface="Arial" pitchFamily="34" charset="0"/>
+              </a:rPr>
+              <a:t>FunctionalInterface</a:t>
+            </a:r>
+            <a:r>
+              <a:rPr lang="en-US" dirty="0">
+                <a:latin typeface="Arial" pitchFamily="34" charset="0"/>
+                <a:cs typeface="Arial" pitchFamily="34" charset="0"/>
+              </a:rPr>
+              <a:t>   </a:t>
+            </a:r>
+          </a:p>
+          <a:p>
+            <a:pPr>
+              <a:buNone/>
+            </a:pPr>
+            <a:r>
+              <a:rPr lang="en-US" b="1" dirty="0">
+                <a:latin typeface="Arial" pitchFamily="34" charset="0"/>
+                <a:cs typeface="Arial" pitchFamily="34" charset="0"/>
+              </a:rPr>
+              <a:t>interface</a:t>
+            </a:r>
+            <a:r>
+              <a:rPr lang="en-US" dirty="0">
+                <a:latin typeface="Arial" pitchFamily="34" charset="0"/>
+                <a:cs typeface="Arial" pitchFamily="34" charset="0"/>
+              </a:rPr>
+              <a:t> Drawable{  </a:t>
+            </a:r>
+          </a:p>
+          <a:p>
+            <a:pPr>
+              <a:buNone/>
+            </a:pPr>
+            <a:r>
+              <a:rPr lang="en-US" dirty="0">
+                <a:latin typeface="Arial" pitchFamily="34" charset="0"/>
+                <a:cs typeface="Arial" pitchFamily="34" charset="0"/>
+              </a:rPr>
+              <a:t>    </a:t>
+            </a:r>
+            <a:r>
+              <a:rPr lang="en-US" b="1" dirty="0">
+                <a:latin typeface="Arial" pitchFamily="34" charset="0"/>
+                <a:cs typeface="Arial" pitchFamily="34" charset="0"/>
+              </a:rPr>
+              <a:t>public</a:t>
+            </a:r>
+            <a:r>
+              <a:rPr lang="en-US" dirty="0">
+                <a:latin typeface="Arial" pitchFamily="34" charset="0"/>
+                <a:cs typeface="Arial" pitchFamily="34" charset="0"/>
+              </a:rPr>
+              <a:t> </a:t>
+            </a:r>
+            <a:r>
+              <a:rPr lang="en-US" b="1" dirty="0">
+                <a:latin typeface="Arial" pitchFamily="34" charset="0"/>
+                <a:cs typeface="Arial" pitchFamily="34" charset="0"/>
+              </a:rPr>
+              <a:t>void</a:t>
+            </a:r>
+            <a:r>
+              <a:rPr lang="en-US" dirty="0">
+                <a:latin typeface="Arial" pitchFamily="34" charset="0"/>
+                <a:cs typeface="Arial" pitchFamily="34" charset="0"/>
+              </a:rPr>
+              <a:t> draw();  </a:t>
+            </a:r>
+          </a:p>
+          <a:p>
+            <a:pPr>
+              <a:buNone/>
+            </a:pPr>
+            <a:r>
+              <a:rPr lang="en-US" dirty="0">
+                <a:latin typeface="Arial" pitchFamily="34" charset="0"/>
+                <a:cs typeface="Arial" pitchFamily="34" charset="0"/>
+              </a:rPr>
+              <a:t>}  </a:t>
+            </a:r>
+          </a:p>
+          <a:p>
+            <a:pPr>
+              <a:buNone/>
+            </a:pPr>
+            <a:r>
+              <a:rPr lang="en-US" dirty="0">
+                <a:latin typeface="Arial" pitchFamily="34" charset="0"/>
+                <a:cs typeface="Arial" pitchFamily="34" charset="0"/>
+              </a:rPr>
+              <a:t>  </a:t>
+            </a:r>
+          </a:p>
+          <a:p>
+            <a:pPr>
+              <a:buNone/>
+            </a:pPr>
+            <a:r>
+              <a:rPr lang="en-US" b="1" dirty="0">
+                <a:latin typeface="Arial" pitchFamily="34" charset="0"/>
+                <a:cs typeface="Arial" pitchFamily="34" charset="0"/>
+              </a:rPr>
+              <a:t>public</a:t>
+            </a:r>
+            <a:r>
+              <a:rPr lang="en-US" dirty="0">
+                <a:latin typeface="Arial" pitchFamily="34" charset="0"/>
+                <a:cs typeface="Arial" pitchFamily="34" charset="0"/>
+              </a:rPr>
+              <a:t> </a:t>
+            </a:r>
+            <a:r>
+              <a:rPr lang="en-US" b="1" dirty="0">
+                <a:latin typeface="Arial" pitchFamily="34" charset="0"/>
+                <a:cs typeface="Arial" pitchFamily="34" charset="0"/>
+              </a:rPr>
+              <a:t>class</a:t>
+            </a:r>
+            <a:r>
+              <a:rPr lang="en-US" dirty="0">
+                <a:latin typeface="Arial" pitchFamily="34" charset="0"/>
+                <a:cs typeface="Arial" pitchFamily="34" charset="0"/>
+              </a:rPr>
+              <a:t> LambdaExpressionExample2 {  </a:t>
+            </a:r>
+          </a:p>
+          <a:p>
+            <a:pPr>
+              <a:buNone/>
+            </a:pPr>
+            <a:r>
+              <a:rPr lang="en-US" dirty="0">
+                <a:latin typeface="Arial" pitchFamily="34" charset="0"/>
+                <a:cs typeface="Arial" pitchFamily="34" charset="0"/>
+              </a:rPr>
+              <a:t>    </a:t>
+            </a:r>
+            <a:r>
+              <a:rPr lang="en-US" b="1" dirty="0">
+                <a:latin typeface="Arial" pitchFamily="34" charset="0"/>
+                <a:cs typeface="Arial" pitchFamily="34" charset="0"/>
+              </a:rPr>
+              <a:t>public</a:t>
+            </a:r>
+            <a:r>
+              <a:rPr lang="en-US" dirty="0">
+                <a:latin typeface="Arial" pitchFamily="34" charset="0"/>
+                <a:cs typeface="Arial" pitchFamily="34" charset="0"/>
+              </a:rPr>
+              <a:t> </a:t>
+            </a:r>
+            <a:r>
+              <a:rPr lang="en-US" b="1" dirty="0">
+                <a:latin typeface="Arial" pitchFamily="34" charset="0"/>
+                <a:cs typeface="Arial" pitchFamily="34" charset="0"/>
+              </a:rPr>
+              <a:t>static</a:t>
+            </a:r>
+            <a:r>
+              <a:rPr lang="en-US" dirty="0">
+                <a:latin typeface="Arial" pitchFamily="34" charset="0"/>
+                <a:cs typeface="Arial" pitchFamily="34" charset="0"/>
+              </a:rPr>
+              <a:t> </a:t>
+            </a:r>
+            <a:r>
+              <a:rPr lang="en-US" b="1" dirty="0">
+                <a:latin typeface="Arial" pitchFamily="34" charset="0"/>
+                <a:cs typeface="Arial" pitchFamily="34" charset="0"/>
+              </a:rPr>
+              <a:t>void</a:t>
+            </a:r>
+            <a:r>
+              <a:rPr lang="en-US" dirty="0">
+                <a:latin typeface="Arial" pitchFamily="34" charset="0"/>
+                <a:cs typeface="Arial" pitchFamily="34" charset="0"/>
+              </a:rPr>
+              <a:t> main(String[] args) {  </a:t>
+            </a:r>
+          </a:p>
+          <a:p>
+            <a:pPr>
+              <a:buNone/>
+            </a:pPr>
+            <a:r>
+              <a:rPr lang="en-US" dirty="0">
+                <a:latin typeface="Arial" pitchFamily="34" charset="0"/>
+                <a:cs typeface="Arial" pitchFamily="34" charset="0"/>
+              </a:rPr>
+              <a:t>        </a:t>
+            </a:r>
+            <a:r>
+              <a:rPr lang="en-US" b="1" dirty="0">
+                <a:latin typeface="Arial" pitchFamily="34" charset="0"/>
+                <a:cs typeface="Arial" pitchFamily="34" charset="0"/>
+              </a:rPr>
+              <a:t>int</a:t>
+            </a:r>
+            <a:r>
+              <a:rPr lang="en-US" dirty="0">
+                <a:latin typeface="Arial" pitchFamily="34" charset="0"/>
+                <a:cs typeface="Arial" pitchFamily="34" charset="0"/>
+              </a:rPr>
+              <a:t> </a:t>
+            </a:r>
+            <a:r>
+              <a:rPr lang="en-US" dirty="0" smtClean="0">
+                <a:latin typeface="Arial" pitchFamily="34" charset="0"/>
+                <a:cs typeface="Arial" pitchFamily="34" charset="0"/>
+              </a:rPr>
+              <a:t>width</a:t>
+            </a:r>
+            <a:r>
+              <a:rPr lang="ru-RU" dirty="0" smtClean="0">
+                <a:latin typeface="Arial" pitchFamily="34" charset="0"/>
+                <a:cs typeface="Arial" pitchFamily="34" charset="0"/>
+              </a:rPr>
+              <a:t> </a:t>
+            </a:r>
+            <a:r>
+              <a:rPr lang="en-US" dirty="0" smtClean="0">
+                <a:latin typeface="Arial" pitchFamily="34" charset="0"/>
+                <a:cs typeface="Arial" pitchFamily="34" charset="0"/>
+              </a:rPr>
+              <a:t>=</a:t>
+            </a:r>
+            <a:r>
+              <a:rPr lang="ru-RU" dirty="0" smtClean="0">
+                <a:latin typeface="Arial" pitchFamily="34" charset="0"/>
+                <a:cs typeface="Arial" pitchFamily="34" charset="0"/>
+              </a:rPr>
+              <a:t> </a:t>
+            </a:r>
+            <a:r>
+              <a:rPr lang="en-US" dirty="0" smtClean="0">
+                <a:latin typeface="Arial" pitchFamily="34" charset="0"/>
+                <a:cs typeface="Arial" pitchFamily="34" charset="0"/>
+              </a:rPr>
+              <a:t>10</a:t>
+            </a:r>
+            <a:r>
+              <a:rPr lang="en-US" dirty="0">
+                <a:latin typeface="Arial" pitchFamily="34" charset="0"/>
+                <a:cs typeface="Arial" pitchFamily="34" charset="0"/>
+              </a:rPr>
+              <a:t>;  </a:t>
+            </a:r>
+          </a:p>
+          <a:p>
+            <a:pPr>
+              <a:buNone/>
+            </a:pPr>
+            <a:r>
+              <a:rPr lang="en-US" dirty="0">
+                <a:latin typeface="Arial" pitchFamily="34" charset="0"/>
+                <a:cs typeface="Arial" pitchFamily="34" charset="0"/>
+              </a:rPr>
+              <a:t>          </a:t>
+            </a:r>
+          </a:p>
+          <a:p>
+            <a:pPr>
+              <a:buNone/>
+            </a:pPr>
+            <a:r>
+              <a:rPr lang="en-US" dirty="0">
+                <a:latin typeface="Arial" pitchFamily="34" charset="0"/>
+                <a:cs typeface="Arial" pitchFamily="34" charset="0"/>
+              </a:rPr>
+              <a:t>        </a:t>
+            </a:r>
+            <a:r>
+              <a:rPr lang="en-US" dirty="0">
+                <a:solidFill>
+                  <a:srgbClr val="00B050"/>
+                </a:solidFill>
+                <a:latin typeface="Arial" pitchFamily="34" charset="0"/>
+                <a:cs typeface="Arial" pitchFamily="34" charset="0"/>
+              </a:rPr>
+              <a:t>//with lambda</a:t>
+            </a:r>
+            <a:r>
+              <a:rPr lang="en-US" dirty="0">
+                <a:latin typeface="Arial" pitchFamily="34" charset="0"/>
+                <a:cs typeface="Arial" pitchFamily="34" charset="0"/>
+              </a:rPr>
+              <a:t>  </a:t>
+            </a:r>
+          </a:p>
+          <a:p>
+            <a:pPr>
+              <a:buNone/>
+            </a:pPr>
+            <a:r>
+              <a:rPr lang="en-US" dirty="0">
+                <a:latin typeface="Arial" pitchFamily="34" charset="0"/>
+                <a:cs typeface="Arial" pitchFamily="34" charset="0"/>
+              </a:rPr>
+              <a:t>        Drawable </a:t>
+            </a:r>
+            <a:r>
+              <a:rPr lang="en-US" dirty="0" smtClean="0">
+                <a:latin typeface="Arial" pitchFamily="34" charset="0"/>
+                <a:cs typeface="Arial" pitchFamily="34" charset="0"/>
+              </a:rPr>
+              <a:t>d2</a:t>
+            </a:r>
+            <a:r>
+              <a:rPr lang="ru-RU" dirty="0" smtClean="0">
+                <a:latin typeface="Arial" pitchFamily="34" charset="0"/>
+                <a:cs typeface="Arial" pitchFamily="34" charset="0"/>
+              </a:rPr>
+              <a:t> </a:t>
+            </a:r>
+            <a:r>
+              <a:rPr lang="en-US" dirty="0" smtClean="0">
+                <a:latin typeface="Arial" pitchFamily="34" charset="0"/>
+                <a:cs typeface="Arial" pitchFamily="34" charset="0"/>
+              </a:rPr>
+              <a:t>=</a:t>
+            </a:r>
+            <a:r>
+              <a:rPr lang="ru-RU" dirty="0" smtClean="0">
+                <a:latin typeface="Arial" pitchFamily="34" charset="0"/>
+                <a:cs typeface="Arial" pitchFamily="34" charset="0"/>
+              </a:rPr>
+              <a:t> </a:t>
+            </a:r>
+            <a:r>
+              <a:rPr lang="en-US" dirty="0" smtClean="0">
+                <a:latin typeface="Arial" pitchFamily="34" charset="0"/>
+                <a:cs typeface="Arial" pitchFamily="34" charset="0"/>
+              </a:rPr>
+              <a:t>()</a:t>
+            </a:r>
+            <a:r>
+              <a:rPr lang="ru-RU" dirty="0" smtClean="0">
+                <a:latin typeface="Arial" pitchFamily="34" charset="0"/>
+                <a:cs typeface="Arial" pitchFamily="34" charset="0"/>
+              </a:rPr>
+              <a:t> </a:t>
+            </a:r>
+            <a:r>
+              <a:rPr lang="en-US" dirty="0" smtClean="0">
+                <a:latin typeface="Arial" pitchFamily="34" charset="0"/>
+                <a:cs typeface="Arial" pitchFamily="34" charset="0"/>
+              </a:rPr>
+              <a:t>-&gt;</a:t>
+            </a:r>
+            <a:r>
+              <a:rPr lang="ru-RU" dirty="0" smtClean="0">
+                <a:latin typeface="Arial" pitchFamily="34" charset="0"/>
+                <a:cs typeface="Arial" pitchFamily="34" charset="0"/>
+              </a:rPr>
+              <a:t> </a:t>
+            </a:r>
+            <a:r>
+              <a:rPr lang="en-US" dirty="0" smtClean="0">
+                <a:latin typeface="Arial" pitchFamily="34" charset="0"/>
+                <a:cs typeface="Arial" pitchFamily="34" charset="0"/>
+              </a:rPr>
+              <a:t>{</a:t>
+            </a:r>
+            <a:r>
+              <a:rPr lang="en-US" dirty="0">
+                <a:latin typeface="Arial" pitchFamily="34" charset="0"/>
+                <a:cs typeface="Arial" pitchFamily="34" charset="0"/>
+              </a:rPr>
+              <a:t>  </a:t>
+            </a:r>
+          </a:p>
+          <a:p>
+            <a:pPr>
+              <a:buNone/>
+            </a:pPr>
+            <a:r>
+              <a:rPr lang="en-US" dirty="0">
+                <a:latin typeface="Arial" pitchFamily="34" charset="0"/>
+                <a:cs typeface="Arial" pitchFamily="34" charset="0"/>
+              </a:rPr>
+              <a:t>            System.out.println("Drawing "+width);  </a:t>
+            </a:r>
+          </a:p>
+          <a:p>
+            <a:pPr>
+              <a:buNone/>
+            </a:pPr>
+            <a:r>
+              <a:rPr lang="en-US" dirty="0">
+                <a:latin typeface="Arial" pitchFamily="34" charset="0"/>
+                <a:cs typeface="Arial" pitchFamily="34" charset="0"/>
+              </a:rPr>
+              <a:t>        };  </a:t>
+            </a:r>
+          </a:p>
+          <a:p>
+            <a:pPr>
+              <a:buNone/>
+            </a:pPr>
+            <a:r>
+              <a:rPr lang="en-US" dirty="0">
+                <a:latin typeface="Arial" pitchFamily="34" charset="0"/>
+                <a:cs typeface="Arial" pitchFamily="34" charset="0"/>
+              </a:rPr>
+              <a:t>        d2.draw();  </a:t>
+            </a:r>
+          </a:p>
+          <a:p>
+            <a:pPr>
+              <a:buNone/>
+            </a:pPr>
+            <a:r>
+              <a:rPr lang="en-US" dirty="0">
+                <a:latin typeface="Arial" pitchFamily="34" charset="0"/>
+                <a:cs typeface="Arial" pitchFamily="34" charset="0"/>
+              </a:rPr>
+              <a:t>    }  </a:t>
+            </a:r>
+          </a:p>
+          <a:p>
+            <a:pPr>
+              <a:buNone/>
+            </a:pPr>
+            <a:r>
+              <a:rPr lang="en-US" dirty="0">
+                <a:latin typeface="Arial" pitchFamily="34" charset="0"/>
+                <a:cs typeface="Arial" pitchFamily="34" charset="0"/>
+              </a:rPr>
+              <a:t>}  </a:t>
+            </a:r>
           </a:p>
         </p:txBody>
       </p:sp>

</xml_diff>

<commit_message>
added 4 slides about parameters and return keyword
</commit_message>
<xml_diff>
--- a/lambdas.pptx
+++ b/lambdas.pptx
@@ -11,6 +11,10 @@
     <p:sldId id="261" r:id="rId5"/>
     <p:sldId id="259" r:id="rId6"/>
     <p:sldId id="260" r:id="rId7"/>
+    <p:sldId id="262" r:id="rId8"/>
+    <p:sldId id="263" r:id="rId9"/>
+    <p:sldId id="264" r:id="rId10"/>
+    <p:sldId id="265" r:id="rId11"/>
   </p:sldIdLst>
   <p:sldSz cx="9144000" cy="6858000" type="screen4x3"/>
   <p:notesSz cx="6858000" cy="9144000"/>
@@ -3192,6 +3196,516 @@
 </p:sld>
 </file>
 
+<file path=ppt/slides/slide10.xml><?xml version="1.0" encoding="utf-8"?>
+<p:sld xmlns:a="http://schemas.openxmlformats.org/drawingml/2006/main" xmlns:r="http://schemas.openxmlformats.org/officeDocument/2006/relationships" xmlns:p="http://schemas.openxmlformats.org/presentationml/2006/main">
+  <p:cSld>
+    <p:spTree>
+      <p:nvGrpSpPr>
+        <p:cNvPr id="1" name=""/>
+        <p:cNvGrpSpPr/>
+        <p:nvPr/>
+      </p:nvGrpSpPr>
+      <p:grpSpPr>
+        <a:xfrm>
+          <a:off x="0" y="0"/>
+          <a:ext cx="0" cy="0"/>
+          <a:chOff x="0" y="0"/>
+          <a:chExt cx="0" cy="0"/>
+        </a:xfrm>
+      </p:grpSpPr>
+      <p:sp>
+        <p:nvSpPr>
+          <p:cNvPr id="4" name="Заголовок 3"/>
+          <p:cNvSpPr>
+            <a:spLocks noGrp="1"/>
+          </p:cNvSpPr>
+          <p:nvPr>
+            <p:ph type="title"/>
+          </p:nvPr>
+        </p:nvSpPr>
+        <p:spPr/>
+        <p:txBody>
+          <a:bodyPr>
+            <a:noAutofit/>
+          </a:bodyPr>
+          <a:lstStyle/>
+          <a:p>
+            <a:r>
+              <a:rPr lang="en-US" sz="2400" i="1" dirty="0"/>
+              <a:t>In Java lambda expression, if there is only one statement, you may or may not use return keyword. You must use return keyword when lambda expression contains multiple statements.</a:t>
+            </a:r>
+            <a:endParaRPr lang="uk-UA" sz="2400" i="1" dirty="0"/>
+          </a:p>
+        </p:txBody>
+      </p:sp>
+      <p:sp>
+        <p:nvSpPr>
+          <p:cNvPr id="5" name="Текст 4"/>
+          <p:cNvSpPr>
+            <a:spLocks noGrp="1"/>
+          </p:cNvSpPr>
+          <p:nvPr>
+            <p:ph type="body" idx="1"/>
+          </p:nvPr>
+        </p:nvSpPr>
+        <p:spPr>
+          <a:xfrm>
+            <a:off x="1214414" y="1285860"/>
+            <a:ext cx="7000924" cy="639762"/>
+          </a:xfrm>
+        </p:spPr>
+        <p:txBody>
+          <a:bodyPr>
+            <a:normAutofit/>
+          </a:bodyPr>
+          <a:lstStyle/>
+          <a:p>
+            <a:pPr algn="ctr"/>
+            <a:r>
+              <a:rPr lang="en-US" dirty="0">
+                <a:solidFill>
+                  <a:srgbClr val="7030A0"/>
+                </a:solidFill>
+              </a:rPr>
+              <a:t>L</a:t>
+            </a:r>
+            <a:r>
+              <a:rPr lang="en-US" dirty="0" smtClean="0">
+                <a:solidFill>
+                  <a:srgbClr val="7030A0"/>
+                </a:solidFill>
+              </a:rPr>
+              <a:t>ambda expression: with or without return keyword</a:t>
+            </a:r>
+            <a:endParaRPr lang="uk-UA" dirty="0">
+              <a:solidFill>
+                <a:srgbClr val="7030A0"/>
+              </a:solidFill>
+            </a:endParaRPr>
+          </a:p>
+        </p:txBody>
+      </p:sp>
+      <p:sp>
+        <p:nvSpPr>
+          <p:cNvPr id="6" name="Содержимое 5"/>
+          <p:cNvSpPr>
+            <a:spLocks noGrp="1"/>
+          </p:cNvSpPr>
+          <p:nvPr>
+            <p:ph sz="half" idx="2"/>
+          </p:nvPr>
+        </p:nvSpPr>
+        <p:spPr>
+          <a:xfrm>
+            <a:off x="428596" y="2000240"/>
+            <a:ext cx="8215370" cy="4572032"/>
+          </a:xfrm>
+        </p:spPr>
+        <p:style>
+          <a:lnRef idx="1">
+            <a:schemeClr val="dk1"/>
+          </a:lnRef>
+          <a:fillRef idx="2">
+            <a:schemeClr val="dk1"/>
+          </a:fillRef>
+          <a:effectRef idx="1">
+            <a:schemeClr val="dk1"/>
+          </a:effectRef>
+          <a:fontRef idx="minor">
+            <a:schemeClr val="dk1"/>
+          </a:fontRef>
+        </p:style>
+        <p:txBody>
+          <a:bodyPr>
+            <a:normAutofit fontScale="92500" lnSpcReduction="10000"/>
+          </a:bodyPr>
+          <a:lstStyle/>
+          <a:p>
+            <a:pPr>
+              <a:buNone/>
+            </a:pPr>
+            <a:r>
+              <a:rPr lang="en-US" sz="2000" b="1" dirty="0">
+                <a:latin typeface="Arial" pitchFamily="34" charset="0"/>
+                <a:cs typeface="Arial" pitchFamily="34" charset="0"/>
+              </a:rPr>
+              <a:t>public</a:t>
+            </a:r>
+            <a:r>
+              <a:rPr lang="en-US" sz="2000" dirty="0">
+                <a:latin typeface="Arial" pitchFamily="34" charset="0"/>
+                <a:cs typeface="Arial" pitchFamily="34" charset="0"/>
+              </a:rPr>
+              <a:t> </a:t>
+            </a:r>
+            <a:r>
+              <a:rPr lang="en-US" sz="2000" b="1" dirty="0">
+                <a:latin typeface="Arial" pitchFamily="34" charset="0"/>
+                <a:cs typeface="Arial" pitchFamily="34" charset="0"/>
+              </a:rPr>
+              <a:t>class</a:t>
+            </a:r>
+            <a:r>
+              <a:rPr lang="en-US" sz="2000" dirty="0">
+                <a:latin typeface="Arial" pitchFamily="34" charset="0"/>
+                <a:cs typeface="Arial" pitchFamily="34" charset="0"/>
+              </a:rPr>
+              <a:t> LambdaExpressionExample6 {  </a:t>
+            </a:r>
+          </a:p>
+          <a:p>
+            <a:pPr>
+              <a:buNone/>
+            </a:pPr>
+            <a:r>
+              <a:rPr lang="en-US" sz="2000" dirty="0">
+                <a:latin typeface="Arial" pitchFamily="34" charset="0"/>
+                <a:cs typeface="Arial" pitchFamily="34" charset="0"/>
+              </a:rPr>
+              <a:t>    </a:t>
+            </a:r>
+            <a:r>
+              <a:rPr lang="en-US" sz="2000" b="1" dirty="0">
+                <a:latin typeface="Arial" pitchFamily="34" charset="0"/>
+                <a:cs typeface="Arial" pitchFamily="34" charset="0"/>
+              </a:rPr>
+              <a:t>public</a:t>
+            </a:r>
+            <a:r>
+              <a:rPr lang="en-US" sz="2000" dirty="0">
+                <a:latin typeface="Arial" pitchFamily="34" charset="0"/>
+                <a:cs typeface="Arial" pitchFamily="34" charset="0"/>
+              </a:rPr>
+              <a:t> </a:t>
+            </a:r>
+            <a:r>
+              <a:rPr lang="en-US" sz="2000" b="1" dirty="0">
+                <a:latin typeface="Arial" pitchFamily="34" charset="0"/>
+                <a:cs typeface="Arial" pitchFamily="34" charset="0"/>
+              </a:rPr>
+              <a:t>static</a:t>
+            </a:r>
+            <a:r>
+              <a:rPr lang="en-US" sz="2000" dirty="0">
+                <a:latin typeface="Arial" pitchFamily="34" charset="0"/>
+                <a:cs typeface="Arial" pitchFamily="34" charset="0"/>
+              </a:rPr>
+              <a:t> </a:t>
+            </a:r>
+            <a:r>
+              <a:rPr lang="en-US" sz="2000" b="1" dirty="0">
+                <a:latin typeface="Arial" pitchFamily="34" charset="0"/>
+                <a:cs typeface="Arial" pitchFamily="34" charset="0"/>
+              </a:rPr>
+              <a:t>void</a:t>
+            </a:r>
+            <a:r>
+              <a:rPr lang="en-US" sz="2000" dirty="0">
+                <a:latin typeface="Arial" pitchFamily="34" charset="0"/>
+                <a:cs typeface="Arial" pitchFamily="34" charset="0"/>
+              </a:rPr>
+              <a:t> main(String[] args) {  </a:t>
+            </a:r>
+          </a:p>
+          <a:p>
+            <a:pPr>
+              <a:buNone/>
+            </a:pPr>
+            <a:r>
+              <a:rPr lang="en-US" sz="2000" dirty="0">
+                <a:latin typeface="Arial" pitchFamily="34" charset="0"/>
+                <a:cs typeface="Arial" pitchFamily="34" charset="0"/>
+              </a:rPr>
+              <a:t>          </a:t>
+            </a:r>
+          </a:p>
+          <a:p>
+            <a:pPr>
+              <a:buNone/>
+            </a:pPr>
+            <a:r>
+              <a:rPr lang="en-US" sz="2000" dirty="0">
+                <a:latin typeface="Arial" pitchFamily="34" charset="0"/>
+                <a:cs typeface="Arial" pitchFamily="34" charset="0"/>
+              </a:rPr>
+              <a:t>        </a:t>
+            </a:r>
+            <a:r>
+              <a:rPr lang="en-US" sz="2000" dirty="0">
+                <a:solidFill>
+                  <a:srgbClr val="00B050"/>
+                </a:solidFill>
+                <a:latin typeface="Arial" pitchFamily="34" charset="0"/>
+                <a:cs typeface="Arial" pitchFamily="34" charset="0"/>
+              </a:rPr>
+              <a:t>// Lambda expression without return </a:t>
+            </a:r>
+            <a:r>
+              <a:rPr lang="en-US" sz="2000" dirty="0" smtClean="0">
+                <a:solidFill>
+                  <a:srgbClr val="00B050"/>
+                </a:solidFill>
+                <a:latin typeface="Arial" pitchFamily="34" charset="0"/>
+                <a:cs typeface="Arial" pitchFamily="34" charset="0"/>
+              </a:rPr>
+              <a:t>keyword</a:t>
+            </a:r>
+            <a:r>
+              <a:rPr lang="en-US" sz="2000" dirty="0">
+                <a:latin typeface="Arial" pitchFamily="34" charset="0"/>
+                <a:cs typeface="Arial" pitchFamily="34" charset="0"/>
+              </a:rPr>
+              <a:t>  </a:t>
+            </a:r>
+          </a:p>
+          <a:p>
+            <a:pPr>
+              <a:buNone/>
+            </a:pPr>
+            <a:r>
+              <a:rPr lang="en-US" sz="2000" dirty="0">
+                <a:latin typeface="Arial" pitchFamily="34" charset="0"/>
+                <a:cs typeface="Arial" pitchFamily="34" charset="0"/>
+              </a:rPr>
+              <a:t>        Addable ad1=(</a:t>
+            </a:r>
+            <a:r>
+              <a:rPr lang="en-US" sz="2000" dirty="0" err="1">
+                <a:latin typeface="Arial" pitchFamily="34" charset="0"/>
+                <a:cs typeface="Arial" pitchFamily="34" charset="0"/>
+              </a:rPr>
+              <a:t>a,b</a:t>
+            </a:r>
+            <a:r>
+              <a:rPr lang="en-US" sz="2000" dirty="0">
+                <a:latin typeface="Arial" pitchFamily="34" charset="0"/>
+                <a:cs typeface="Arial" pitchFamily="34" charset="0"/>
+              </a:rPr>
+              <a:t>)-&gt;(</a:t>
+            </a:r>
+            <a:r>
+              <a:rPr lang="en-US" sz="2000" dirty="0" err="1">
+                <a:latin typeface="Arial" pitchFamily="34" charset="0"/>
+                <a:cs typeface="Arial" pitchFamily="34" charset="0"/>
+              </a:rPr>
+              <a:t>a+b</a:t>
+            </a:r>
+            <a:r>
+              <a:rPr lang="en-US" sz="2000" dirty="0">
+                <a:latin typeface="Arial" pitchFamily="34" charset="0"/>
+                <a:cs typeface="Arial" pitchFamily="34" charset="0"/>
+              </a:rPr>
+              <a:t>);  </a:t>
+            </a:r>
+          </a:p>
+          <a:p>
+            <a:pPr>
+              <a:buNone/>
+            </a:pPr>
+            <a:r>
+              <a:rPr lang="en-US" sz="2000" dirty="0">
+                <a:latin typeface="Arial" pitchFamily="34" charset="0"/>
+                <a:cs typeface="Arial" pitchFamily="34" charset="0"/>
+              </a:rPr>
+              <a:t>        System.out.println(ad1.add(10,20));  </a:t>
+            </a:r>
+          </a:p>
+          <a:p>
+            <a:pPr>
+              <a:buNone/>
+            </a:pPr>
+            <a:r>
+              <a:rPr lang="en-US" sz="2000" dirty="0">
+                <a:latin typeface="Arial" pitchFamily="34" charset="0"/>
+                <a:cs typeface="Arial" pitchFamily="34" charset="0"/>
+              </a:rPr>
+              <a:t>          </a:t>
+            </a:r>
+          </a:p>
+          <a:p>
+            <a:pPr>
+              <a:buNone/>
+            </a:pPr>
+            <a:r>
+              <a:rPr lang="en-US" sz="2000" dirty="0">
+                <a:latin typeface="Arial" pitchFamily="34" charset="0"/>
+                <a:cs typeface="Arial" pitchFamily="34" charset="0"/>
+              </a:rPr>
+              <a:t>        </a:t>
+            </a:r>
+            <a:r>
+              <a:rPr lang="en-US" sz="2000" dirty="0">
+                <a:solidFill>
+                  <a:srgbClr val="00B050"/>
+                </a:solidFill>
+                <a:latin typeface="Arial" pitchFamily="34" charset="0"/>
+                <a:cs typeface="Arial" pitchFamily="34" charset="0"/>
+              </a:rPr>
+              <a:t>// Lambda expression with return </a:t>
+            </a:r>
+            <a:r>
+              <a:rPr lang="en-US" sz="2000" dirty="0" smtClean="0">
+                <a:solidFill>
+                  <a:srgbClr val="00B050"/>
+                </a:solidFill>
+                <a:latin typeface="Arial" pitchFamily="34" charset="0"/>
+                <a:cs typeface="Arial" pitchFamily="34" charset="0"/>
+              </a:rPr>
+              <a:t>keyword</a:t>
+            </a:r>
+            <a:r>
+              <a:rPr lang="en-US" sz="2000" dirty="0">
+                <a:latin typeface="Arial" pitchFamily="34" charset="0"/>
+                <a:cs typeface="Arial" pitchFamily="34" charset="0"/>
+              </a:rPr>
+              <a:t>    </a:t>
+            </a:r>
+          </a:p>
+          <a:p>
+            <a:pPr>
+              <a:buNone/>
+            </a:pPr>
+            <a:r>
+              <a:rPr lang="en-US" sz="2000" dirty="0">
+                <a:latin typeface="Arial" pitchFamily="34" charset="0"/>
+                <a:cs typeface="Arial" pitchFamily="34" charset="0"/>
+              </a:rPr>
+              <a:t>        Addable ad2=(</a:t>
+            </a:r>
+            <a:r>
+              <a:rPr lang="en-US" sz="2000" b="1" dirty="0">
+                <a:latin typeface="Arial" pitchFamily="34" charset="0"/>
+                <a:cs typeface="Arial" pitchFamily="34" charset="0"/>
+              </a:rPr>
+              <a:t>int</a:t>
+            </a:r>
+            <a:r>
+              <a:rPr lang="en-US" sz="2000" dirty="0">
+                <a:latin typeface="Arial" pitchFamily="34" charset="0"/>
+                <a:cs typeface="Arial" pitchFamily="34" charset="0"/>
+              </a:rPr>
+              <a:t> </a:t>
+            </a:r>
+            <a:r>
+              <a:rPr lang="en-US" sz="2000" dirty="0" err="1">
+                <a:latin typeface="Arial" pitchFamily="34" charset="0"/>
+                <a:cs typeface="Arial" pitchFamily="34" charset="0"/>
+              </a:rPr>
+              <a:t>a,</a:t>
+            </a:r>
+            <a:r>
+              <a:rPr lang="en-US" sz="2000" b="1" dirty="0" err="1">
+                <a:latin typeface="Arial" pitchFamily="34" charset="0"/>
+                <a:cs typeface="Arial" pitchFamily="34" charset="0"/>
+              </a:rPr>
+              <a:t>int</a:t>
+            </a:r>
+            <a:r>
+              <a:rPr lang="en-US" sz="2000" dirty="0">
+                <a:latin typeface="Arial" pitchFamily="34" charset="0"/>
+                <a:cs typeface="Arial" pitchFamily="34" charset="0"/>
+              </a:rPr>
+              <a:t> b)-&gt;{  </a:t>
+            </a:r>
+          </a:p>
+          <a:p>
+            <a:pPr>
+              <a:buNone/>
+            </a:pPr>
+            <a:r>
+              <a:rPr lang="en-US" sz="2000" dirty="0">
+                <a:latin typeface="Arial" pitchFamily="34" charset="0"/>
+                <a:cs typeface="Arial" pitchFamily="34" charset="0"/>
+              </a:rPr>
+              <a:t>                            </a:t>
+            </a:r>
+            <a:r>
+              <a:rPr lang="en-US" sz="2000" b="1" dirty="0">
+                <a:latin typeface="Arial" pitchFamily="34" charset="0"/>
+                <a:cs typeface="Arial" pitchFamily="34" charset="0"/>
+              </a:rPr>
+              <a:t>return</a:t>
+            </a:r>
+            <a:r>
+              <a:rPr lang="en-US" sz="2000" dirty="0">
+                <a:latin typeface="Arial" pitchFamily="34" charset="0"/>
+                <a:cs typeface="Arial" pitchFamily="34" charset="0"/>
+              </a:rPr>
+              <a:t> (</a:t>
+            </a:r>
+            <a:r>
+              <a:rPr lang="en-US" sz="2000" dirty="0" err="1">
+                <a:latin typeface="Arial" pitchFamily="34" charset="0"/>
+                <a:cs typeface="Arial" pitchFamily="34" charset="0"/>
+              </a:rPr>
+              <a:t>a+b</a:t>
+            </a:r>
+            <a:r>
+              <a:rPr lang="en-US" sz="2000" dirty="0">
+                <a:latin typeface="Arial" pitchFamily="34" charset="0"/>
+                <a:cs typeface="Arial" pitchFamily="34" charset="0"/>
+              </a:rPr>
+              <a:t>);   </a:t>
+            </a:r>
+          </a:p>
+          <a:p>
+            <a:pPr>
+              <a:buNone/>
+            </a:pPr>
+            <a:r>
+              <a:rPr lang="en-US" sz="2000" dirty="0">
+                <a:latin typeface="Arial" pitchFamily="34" charset="0"/>
+                <a:cs typeface="Arial" pitchFamily="34" charset="0"/>
+              </a:rPr>
+              <a:t>                            };  </a:t>
+            </a:r>
+          </a:p>
+          <a:p>
+            <a:pPr>
+              <a:buNone/>
+            </a:pPr>
+            <a:r>
+              <a:rPr lang="en-US" sz="2000" dirty="0">
+                <a:latin typeface="Arial" pitchFamily="34" charset="0"/>
+                <a:cs typeface="Arial" pitchFamily="34" charset="0"/>
+              </a:rPr>
+              <a:t>        System.out.println(ad2.add(100,200));  </a:t>
+            </a:r>
+          </a:p>
+          <a:p>
+            <a:pPr>
+              <a:buNone/>
+            </a:pPr>
+            <a:r>
+              <a:rPr lang="en-US" sz="2000" dirty="0">
+                <a:latin typeface="Arial" pitchFamily="34" charset="0"/>
+                <a:cs typeface="Arial" pitchFamily="34" charset="0"/>
+              </a:rPr>
+              <a:t>    }  </a:t>
+            </a:r>
+          </a:p>
+          <a:p>
+            <a:pPr>
+              <a:buNone/>
+            </a:pPr>
+            <a:r>
+              <a:rPr lang="en-US" sz="2000" dirty="0">
+                <a:latin typeface="Arial" pitchFamily="34" charset="0"/>
+                <a:cs typeface="Arial" pitchFamily="34" charset="0"/>
+              </a:rPr>
+              <a:t>}  </a:t>
+            </a:r>
+          </a:p>
+        </p:txBody>
+      </p:sp>
+    </p:spTree>
+  </p:cSld>
+  <p:clrMapOvr>
+    <a:masterClrMapping/>
+  </p:clrMapOvr>
+</p:sld>
+</file>
+
 <file path=ppt/slides/slide2.xml><?xml version="1.0" encoding="utf-8"?>
 <p:sld xmlns:a="http://schemas.openxmlformats.org/drawingml/2006/main" xmlns:r="http://schemas.openxmlformats.org/officeDocument/2006/relationships" xmlns:p="http://schemas.openxmlformats.org/presentationml/2006/main">
   <p:cSld>
@@ -4856,6 +5370,1633 @@
             </a:pPr>
             <a:r>
               <a:rPr lang="en-US" dirty="0">
+                <a:latin typeface="Arial" pitchFamily="34" charset="0"/>
+                <a:cs typeface="Arial" pitchFamily="34" charset="0"/>
+              </a:rPr>
+              <a:t>}  </a:t>
+            </a:r>
+          </a:p>
+        </p:txBody>
+      </p:sp>
+    </p:spTree>
+  </p:cSld>
+  <p:clrMapOvr>
+    <a:masterClrMapping/>
+  </p:clrMapOvr>
+</p:sld>
+</file>
+
+<file path=ppt/slides/slide7.xml><?xml version="1.0" encoding="utf-8"?>
+<p:sld xmlns:a="http://schemas.openxmlformats.org/drawingml/2006/main" xmlns:r="http://schemas.openxmlformats.org/officeDocument/2006/relationships" xmlns:p="http://schemas.openxmlformats.org/presentationml/2006/main">
+  <p:cSld>
+    <p:spTree>
+      <p:nvGrpSpPr>
+        <p:cNvPr id="1" name=""/>
+        <p:cNvGrpSpPr/>
+        <p:nvPr/>
+      </p:nvGrpSpPr>
+      <p:grpSpPr>
+        <a:xfrm>
+          <a:off x="0" y="0"/>
+          <a:ext cx="0" cy="0"/>
+          <a:chOff x="0" y="0"/>
+          <a:chExt cx="0" cy="0"/>
+        </a:xfrm>
+      </p:grpSpPr>
+      <p:sp>
+        <p:nvSpPr>
+          <p:cNvPr id="4" name="Заголовок 3"/>
+          <p:cNvSpPr>
+            <a:spLocks noGrp="1"/>
+          </p:cNvSpPr>
+          <p:nvPr>
+            <p:ph type="title"/>
+          </p:nvPr>
+        </p:nvSpPr>
+        <p:spPr/>
+        <p:txBody>
+          <a:bodyPr>
+            <a:normAutofit/>
+          </a:bodyPr>
+          <a:lstStyle/>
+          <a:p>
+            <a:r>
+              <a:rPr lang="en-US" sz="2600" i="1" dirty="0"/>
+              <a:t>A lambda expression can have zero or any number of arguments</a:t>
+            </a:r>
+            <a:r>
+              <a:rPr lang="en-US" sz="2600" i="1" dirty="0" smtClean="0"/>
+              <a:t>.</a:t>
+            </a:r>
+            <a:endParaRPr lang="uk-UA" sz="2600" i="1" dirty="0"/>
+          </a:p>
+        </p:txBody>
+      </p:sp>
+      <p:sp>
+        <p:nvSpPr>
+          <p:cNvPr id="5" name="Текст 4"/>
+          <p:cNvSpPr>
+            <a:spLocks noGrp="1"/>
+          </p:cNvSpPr>
+          <p:nvPr>
+            <p:ph type="body" idx="1"/>
+          </p:nvPr>
+        </p:nvSpPr>
+        <p:spPr>
+          <a:xfrm>
+            <a:off x="2071670" y="1285860"/>
+            <a:ext cx="5286412" cy="639762"/>
+          </a:xfrm>
+        </p:spPr>
+        <p:txBody>
+          <a:bodyPr>
+            <a:normAutofit/>
+          </a:bodyPr>
+          <a:lstStyle/>
+          <a:p>
+            <a:pPr algn="ctr"/>
+            <a:r>
+              <a:rPr lang="en-US" dirty="0">
+                <a:solidFill>
+                  <a:srgbClr val="7030A0"/>
+                </a:solidFill>
+              </a:rPr>
+              <a:t>L</a:t>
+            </a:r>
+            <a:r>
+              <a:rPr lang="en-US" dirty="0" smtClean="0">
+                <a:solidFill>
+                  <a:srgbClr val="7030A0"/>
+                </a:solidFill>
+              </a:rPr>
+              <a:t>ambda expression: no parameter</a:t>
+            </a:r>
+            <a:endParaRPr lang="uk-UA" dirty="0">
+              <a:solidFill>
+                <a:srgbClr val="7030A0"/>
+              </a:solidFill>
+            </a:endParaRPr>
+          </a:p>
+        </p:txBody>
+      </p:sp>
+      <p:sp>
+        <p:nvSpPr>
+          <p:cNvPr id="6" name="Содержимое 5"/>
+          <p:cNvSpPr>
+            <a:spLocks noGrp="1"/>
+          </p:cNvSpPr>
+          <p:nvPr>
+            <p:ph sz="half" idx="2"/>
+          </p:nvPr>
+        </p:nvSpPr>
+        <p:spPr>
+          <a:xfrm>
+            <a:off x="428596" y="2000240"/>
+            <a:ext cx="8215370" cy="4572032"/>
+          </a:xfrm>
+        </p:spPr>
+        <p:style>
+          <a:lnRef idx="1">
+            <a:schemeClr val="dk1"/>
+          </a:lnRef>
+          <a:fillRef idx="2">
+            <a:schemeClr val="dk1"/>
+          </a:fillRef>
+          <a:effectRef idx="1">
+            <a:schemeClr val="dk1"/>
+          </a:effectRef>
+          <a:fontRef idx="minor">
+            <a:schemeClr val="dk1"/>
+          </a:fontRef>
+        </p:style>
+        <p:txBody>
+          <a:bodyPr>
+            <a:normAutofit/>
+          </a:bodyPr>
+          <a:lstStyle/>
+          <a:p>
+            <a:pPr>
+              <a:buNone/>
+            </a:pPr>
+            <a:endParaRPr lang="ru-RU" sz="1900" b="1" dirty="0" smtClean="0">
+              <a:latin typeface="Arial" pitchFamily="34" charset="0"/>
+              <a:cs typeface="Arial" pitchFamily="34" charset="0"/>
+            </a:endParaRPr>
+          </a:p>
+          <a:p>
+            <a:pPr>
+              <a:buNone/>
+            </a:pPr>
+            <a:r>
+              <a:rPr lang="en-US" sz="1900" b="1" dirty="0" smtClean="0">
+                <a:latin typeface="Arial" pitchFamily="34" charset="0"/>
+                <a:cs typeface="Arial" pitchFamily="34" charset="0"/>
+              </a:rPr>
+              <a:t>interface</a:t>
+            </a:r>
+            <a:r>
+              <a:rPr lang="en-US" sz="1900" dirty="0">
+                <a:latin typeface="Arial" pitchFamily="34" charset="0"/>
+                <a:cs typeface="Arial" pitchFamily="34" charset="0"/>
+              </a:rPr>
+              <a:t> Sayable{  </a:t>
+            </a:r>
+          </a:p>
+          <a:p>
+            <a:pPr>
+              <a:buNone/>
+            </a:pPr>
+            <a:r>
+              <a:rPr lang="en-US" sz="1900" dirty="0">
+                <a:latin typeface="Arial" pitchFamily="34" charset="0"/>
+                <a:cs typeface="Arial" pitchFamily="34" charset="0"/>
+              </a:rPr>
+              <a:t>    </a:t>
+            </a:r>
+            <a:r>
+              <a:rPr lang="en-US" sz="1900" b="1" dirty="0">
+                <a:latin typeface="Arial" pitchFamily="34" charset="0"/>
+                <a:cs typeface="Arial" pitchFamily="34" charset="0"/>
+              </a:rPr>
+              <a:t>public</a:t>
+            </a:r>
+            <a:r>
+              <a:rPr lang="en-US" sz="1900" dirty="0">
+                <a:latin typeface="Arial" pitchFamily="34" charset="0"/>
+                <a:cs typeface="Arial" pitchFamily="34" charset="0"/>
+              </a:rPr>
+              <a:t> String say();  </a:t>
+            </a:r>
+          </a:p>
+          <a:p>
+            <a:pPr>
+              <a:buNone/>
+            </a:pPr>
+            <a:r>
+              <a:rPr lang="en-US" sz="1900" dirty="0">
+                <a:latin typeface="Arial" pitchFamily="34" charset="0"/>
+                <a:cs typeface="Arial" pitchFamily="34" charset="0"/>
+              </a:rPr>
+              <a:t>}  </a:t>
+            </a:r>
+          </a:p>
+          <a:p>
+            <a:pPr>
+              <a:buNone/>
+            </a:pPr>
+            <a:r>
+              <a:rPr lang="en-US" sz="1900" b="1" dirty="0">
+                <a:latin typeface="Arial" pitchFamily="34" charset="0"/>
+                <a:cs typeface="Arial" pitchFamily="34" charset="0"/>
+              </a:rPr>
+              <a:t>public</a:t>
+            </a:r>
+            <a:r>
+              <a:rPr lang="en-US" sz="1900" dirty="0">
+                <a:latin typeface="Arial" pitchFamily="34" charset="0"/>
+                <a:cs typeface="Arial" pitchFamily="34" charset="0"/>
+              </a:rPr>
+              <a:t> </a:t>
+            </a:r>
+            <a:r>
+              <a:rPr lang="en-US" sz="1900" b="1" dirty="0">
+                <a:latin typeface="Arial" pitchFamily="34" charset="0"/>
+                <a:cs typeface="Arial" pitchFamily="34" charset="0"/>
+              </a:rPr>
+              <a:t>class</a:t>
+            </a:r>
+            <a:r>
+              <a:rPr lang="en-US" sz="1900" dirty="0">
+                <a:latin typeface="Arial" pitchFamily="34" charset="0"/>
+                <a:cs typeface="Arial" pitchFamily="34" charset="0"/>
+              </a:rPr>
+              <a:t> LambdaExpressionExample3{  </a:t>
+            </a:r>
+          </a:p>
+          <a:p>
+            <a:pPr>
+              <a:buNone/>
+            </a:pPr>
+            <a:r>
+              <a:rPr lang="en-US" sz="1900" b="1" dirty="0">
+                <a:latin typeface="Arial" pitchFamily="34" charset="0"/>
+                <a:cs typeface="Arial" pitchFamily="34" charset="0"/>
+              </a:rPr>
+              <a:t>public</a:t>
+            </a:r>
+            <a:r>
+              <a:rPr lang="en-US" sz="1900" dirty="0">
+                <a:latin typeface="Arial" pitchFamily="34" charset="0"/>
+                <a:cs typeface="Arial" pitchFamily="34" charset="0"/>
+              </a:rPr>
+              <a:t> </a:t>
+            </a:r>
+            <a:r>
+              <a:rPr lang="en-US" sz="1900" b="1" dirty="0">
+                <a:latin typeface="Arial" pitchFamily="34" charset="0"/>
+                <a:cs typeface="Arial" pitchFamily="34" charset="0"/>
+              </a:rPr>
+              <a:t>static</a:t>
+            </a:r>
+            <a:r>
+              <a:rPr lang="en-US" sz="1900" dirty="0">
+                <a:latin typeface="Arial" pitchFamily="34" charset="0"/>
+                <a:cs typeface="Arial" pitchFamily="34" charset="0"/>
+              </a:rPr>
+              <a:t> </a:t>
+            </a:r>
+            <a:r>
+              <a:rPr lang="en-US" sz="1900" b="1" dirty="0">
+                <a:latin typeface="Arial" pitchFamily="34" charset="0"/>
+                <a:cs typeface="Arial" pitchFamily="34" charset="0"/>
+              </a:rPr>
+              <a:t>void</a:t>
+            </a:r>
+            <a:r>
+              <a:rPr lang="en-US" sz="1900" dirty="0">
+                <a:latin typeface="Arial" pitchFamily="34" charset="0"/>
+                <a:cs typeface="Arial" pitchFamily="34" charset="0"/>
+              </a:rPr>
+              <a:t> main(String[] args) {  </a:t>
+            </a:r>
+          </a:p>
+          <a:p>
+            <a:pPr>
+              <a:buNone/>
+            </a:pPr>
+            <a:r>
+              <a:rPr lang="en-US" sz="1900" dirty="0">
+                <a:latin typeface="Arial" pitchFamily="34" charset="0"/>
+                <a:cs typeface="Arial" pitchFamily="34" charset="0"/>
+              </a:rPr>
+              <a:t>    Sayable </a:t>
+            </a:r>
+            <a:r>
+              <a:rPr lang="en-US" sz="1900" dirty="0" smtClean="0">
+                <a:latin typeface="Arial" pitchFamily="34" charset="0"/>
+                <a:cs typeface="Arial" pitchFamily="34" charset="0"/>
+              </a:rPr>
+              <a:t>s</a:t>
+            </a:r>
+            <a:r>
+              <a:rPr lang="ru-RU" sz="1900" dirty="0" smtClean="0">
+                <a:latin typeface="Arial" pitchFamily="34" charset="0"/>
+                <a:cs typeface="Arial" pitchFamily="34" charset="0"/>
+              </a:rPr>
+              <a:t> </a:t>
+            </a:r>
+            <a:r>
+              <a:rPr lang="en-US" sz="1900" dirty="0" smtClean="0">
+                <a:latin typeface="Arial" pitchFamily="34" charset="0"/>
+                <a:cs typeface="Arial" pitchFamily="34" charset="0"/>
+              </a:rPr>
+              <a:t>=</a:t>
+            </a:r>
+            <a:r>
+              <a:rPr lang="ru-RU" sz="1900" dirty="0" smtClean="0">
+                <a:latin typeface="Arial" pitchFamily="34" charset="0"/>
+                <a:cs typeface="Arial" pitchFamily="34" charset="0"/>
+              </a:rPr>
+              <a:t> </a:t>
+            </a:r>
+            <a:r>
+              <a:rPr lang="en-US" sz="1900" dirty="0" smtClean="0">
+                <a:latin typeface="Arial" pitchFamily="34" charset="0"/>
+                <a:cs typeface="Arial" pitchFamily="34" charset="0"/>
+              </a:rPr>
+              <a:t>()</a:t>
+            </a:r>
+            <a:r>
+              <a:rPr lang="ru-RU" sz="1900" dirty="0" smtClean="0">
+                <a:latin typeface="Arial" pitchFamily="34" charset="0"/>
+                <a:cs typeface="Arial" pitchFamily="34" charset="0"/>
+              </a:rPr>
+              <a:t> </a:t>
+            </a:r>
+            <a:r>
+              <a:rPr lang="en-US" sz="1900" dirty="0" smtClean="0">
+                <a:latin typeface="Arial" pitchFamily="34" charset="0"/>
+                <a:cs typeface="Arial" pitchFamily="34" charset="0"/>
+              </a:rPr>
+              <a:t>-&gt;</a:t>
+            </a:r>
+            <a:r>
+              <a:rPr lang="ru-RU" sz="1900" dirty="0" smtClean="0">
+                <a:latin typeface="Arial" pitchFamily="34" charset="0"/>
+                <a:cs typeface="Arial" pitchFamily="34" charset="0"/>
+              </a:rPr>
+              <a:t> </a:t>
+            </a:r>
+            <a:r>
+              <a:rPr lang="en-US" sz="1900" dirty="0" smtClean="0">
+                <a:latin typeface="Arial" pitchFamily="34" charset="0"/>
+                <a:cs typeface="Arial" pitchFamily="34" charset="0"/>
+              </a:rPr>
+              <a:t>{</a:t>
+            </a:r>
+            <a:r>
+              <a:rPr lang="en-US" sz="1900" dirty="0">
+                <a:latin typeface="Arial" pitchFamily="34" charset="0"/>
+                <a:cs typeface="Arial" pitchFamily="34" charset="0"/>
+              </a:rPr>
+              <a:t>  </a:t>
+            </a:r>
+          </a:p>
+          <a:p>
+            <a:pPr>
+              <a:buNone/>
+            </a:pPr>
+            <a:r>
+              <a:rPr lang="en-US" sz="1900" dirty="0">
+                <a:latin typeface="Arial" pitchFamily="34" charset="0"/>
+                <a:cs typeface="Arial" pitchFamily="34" charset="0"/>
+              </a:rPr>
+              <a:t>        </a:t>
+            </a:r>
+            <a:r>
+              <a:rPr lang="en-US" sz="1900" b="1" dirty="0">
+                <a:latin typeface="Arial" pitchFamily="34" charset="0"/>
+                <a:cs typeface="Arial" pitchFamily="34" charset="0"/>
+              </a:rPr>
+              <a:t>return</a:t>
+            </a:r>
+            <a:r>
+              <a:rPr lang="en-US" sz="1900" dirty="0">
+                <a:latin typeface="Arial" pitchFamily="34" charset="0"/>
+                <a:cs typeface="Arial" pitchFamily="34" charset="0"/>
+              </a:rPr>
+              <a:t> </a:t>
+            </a:r>
+            <a:r>
+              <a:rPr lang="en-US" sz="1900" dirty="0" smtClean="0">
+                <a:latin typeface="Arial" pitchFamily="34" charset="0"/>
+                <a:cs typeface="Arial" pitchFamily="34" charset="0"/>
+              </a:rPr>
+              <a:t>"</a:t>
+            </a:r>
+            <a:r>
+              <a:rPr lang="ru-RU" sz="1900" dirty="0" smtClean="0">
+                <a:latin typeface="Arial" pitchFamily="34" charset="0"/>
+                <a:cs typeface="Arial" pitchFamily="34" charset="0"/>
+              </a:rPr>
+              <a:t> </a:t>
+            </a:r>
+            <a:r>
+              <a:rPr lang="en-US" sz="1900" dirty="0" smtClean="0">
+                <a:solidFill>
+                  <a:schemeClr val="accent5"/>
+                </a:solidFill>
+                <a:latin typeface="Arial" pitchFamily="34" charset="0"/>
+                <a:cs typeface="Arial" pitchFamily="34" charset="0"/>
+              </a:rPr>
+              <a:t>I</a:t>
+            </a:r>
+            <a:r>
+              <a:rPr lang="en-US" sz="1900" dirty="0">
+                <a:solidFill>
+                  <a:schemeClr val="accent5"/>
+                </a:solidFill>
+                <a:latin typeface="Arial" pitchFamily="34" charset="0"/>
+                <a:cs typeface="Arial" pitchFamily="34" charset="0"/>
+              </a:rPr>
+              <a:t> have nothing to </a:t>
+            </a:r>
+            <a:r>
+              <a:rPr lang="en-US" sz="1900" dirty="0" smtClean="0">
+                <a:solidFill>
+                  <a:schemeClr val="accent5"/>
+                </a:solidFill>
+                <a:latin typeface="Arial" pitchFamily="34" charset="0"/>
+                <a:cs typeface="Arial" pitchFamily="34" charset="0"/>
+              </a:rPr>
+              <a:t>say</a:t>
+            </a:r>
+            <a:r>
+              <a:rPr lang="ru-RU" sz="1900" dirty="0" smtClean="0">
+                <a:solidFill>
+                  <a:schemeClr val="accent5"/>
+                </a:solidFill>
+                <a:latin typeface="Arial" pitchFamily="34" charset="0"/>
+                <a:cs typeface="Arial" pitchFamily="34" charset="0"/>
+              </a:rPr>
+              <a:t> </a:t>
+            </a:r>
+            <a:r>
+              <a:rPr lang="en-US" sz="1900" dirty="0" smtClean="0">
+                <a:latin typeface="Arial" pitchFamily="34" charset="0"/>
+                <a:cs typeface="Arial" pitchFamily="34" charset="0"/>
+              </a:rPr>
+              <a:t>";</a:t>
+            </a:r>
+            <a:r>
+              <a:rPr lang="en-US" sz="1900" dirty="0">
+                <a:latin typeface="Arial" pitchFamily="34" charset="0"/>
+                <a:cs typeface="Arial" pitchFamily="34" charset="0"/>
+              </a:rPr>
+              <a:t>  </a:t>
+            </a:r>
+          </a:p>
+          <a:p>
+            <a:pPr>
+              <a:buNone/>
+            </a:pPr>
+            <a:r>
+              <a:rPr lang="en-US" sz="1900" dirty="0">
+                <a:latin typeface="Arial" pitchFamily="34" charset="0"/>
+                <a:cs typeface="Arial" pitchFamily="34" charset="0"/>
+              </a:rPr>
+              <a:t>    };  </a:t>
+            </a:r>
+          </a:p>
+          <a:p>
+            <a:pPr>
+              <a:buNone/>
+            </a:pPr>
+            <a:r>
+              <a:rPr lang="en-US" sz="1900" dirty="0">
+                <a:latin typeface="Arial" pitchFamily="34" charset="0"/>
+                <a:cs typeface="Arial" pitchFamily="34" charset="0"/>
+              </a:rPr>
+              <a:t>    System.out.println(</a:t>
+            </a:r>
+            <a:r>
+              <a:rPr lang="en-US" sz="1900" dirty="0" err="1">
+                <a:latin typeface="Arial" pitchFamily="34" charset="0"/>
+                <a:cs typeface="Arial" pitchFamily="34" charset="0"/>
+              </a:rPr>
+              <a:t>s.say</a:t>
+            </a:r>
+            <a:r>
+              <a:rPr lang="en-US" sz="1900" dirty="0">
+                <a:latin typeface="Arial" pitchFamily="34" charset="0"/>
+                <a:cs typeface="Arial" pitchFamily="34" charset="0"/>
+              </a:rPr>
+              <a:t>());  </a:t>
+            </a:r>
+          </a:p>
+          <a:p>
+            <a:pPr>
+              <a:buNone/>
+            </a:pPr>
+            <a:r>
+              <a:rPr lang="en-US" sz="1900" dirty="0">
+                <a:latin typeface="Arial" pitchFamily="34" charset="0"/>
+                <a:cs typeface="Arial" pitchFamily="34" charset="0"/>
+              </a:rPr>
+              <a:t>}  </a:t>
+            </a:r>
+          </a:p>
+          <a:p>
+            <a:pPr>
+              <a:buNone/>
+            </a:pPr>
+            <a:r>
+              <a:rPr lang="en-US" sz="1900" dirty="0">
+                <a:latin typeface="Arial" pitchFamily="34" charset="0"/>
+                <a:cs typeface="Arial" pitchFamily="34" charset="0"/>
+              </a:rPr>
+              <a:t>}  </a:t>
+            </a:r>
+          </a:p>
+        </p:txBody>
+      </p:sp>
+    </p:spTree>
+  </p:cSld>
+  <p:clrMapOvr>
+    <a:masterClrMapping/>
+  </p:clrMapOvr>
+</p:sld>
+</file>
+
+<file path=ppt/slides/slide8.xml><?xml version="1.0" encoding="utf-8"?>
+<p:sld xmlns:a="http://schemas.openxmlformats.org/drawingml/2006/main" xmlns:r="http://schemas.openxmlformats.org/officeDocument/2006/relationships" xmlns:p="http://schemas.openxmlformats.org/presentationml/2006/main">
+  <p:cSld>
+    <p:spTree>
+      <p:nvGrpSpPr>
+        <p:cNvPr id="1" name=""/>
+        <p:cNvGrpSpPr/>
+        <p:nvPr/>
+      </p:nvGrpSpPr>
+      <p:grpSpPr>
+        <a:xfrm>
+          <a:off x="0" y="0"/>
+          <a:ext cx="0" cy="0"/>
+          <a:chOff x="0" y="0"/>
+          <a:chExt cx="0" cy="0"/>
+        </a:xfrm>
+      </p:grpSpPr>
+      <p:sp>
+        <p:nvSpPr>
+          <p:cNvPr id="5" name="Текст 4"/>
+          <p:cNvSpPr>
+            <a:spLocks noGrp="1"/>
+          </p:cNvSpPr>
+          <p:nvPr>
+            <p:ph type="body" idx="1"/>
+          </p:nvPr>
+        </p:nvSpPr>
+        <p:spPr>
+          <a:xfrm>
+            <a:off x="2000232" y="0"/>
+            <a:ext cx="5286412" cy="639762"/>
+          </a:xfrm>
+        </p:spPr>
+        <p:txBody>
+          <a:bodyPr>
+            <a:normAutofit/>
+          </a:bodyPr>
+          <a:lstStyle/>
+          <a:p>
+            <a:pPr algn="ctr"/>
+            <a:r>
+              <a:rPr lang="en-US" dirty="0">
+                <a:solidFill>
+                  <a:srgbClr val="7030A0"/>
+                </a:solidFill>
+              </a:rPr>
+              <a:t>L</a:t>
+            </a:r>
+            <a:r>
+              <a:rPr lang="en-US" dirty="0" smtClean="0">
+                <a:solidFill>
+                  <a:srgbClr val="7030A0"/>
+                </a:solidFill>
+              </a:rPr>
+              <a:t>ambda expression: single parameter</a:t>
+            </a:r>
+            <a:endParaRPr lang="uk-UA" dirty="0">
+              <a:solidFill>
+                <a:srgbClr val="7030A0"/>
+              </a:solidFill>
+            </a:endParaRPr>
+          </a:p>
+        </p:txBody>
+      </p:sp>
+      <p:sp>
+        <p:nvSpPr>
+          <p:cNvPr id="6" name="Содержимое 5"/>
+          <p:cNvSpPr>
+            <a:spLocks noGrp="1"/>
+          </p:cNvSpPr>
+          <p:nvPr>
+            <p:ph sz="half" idx="2"/>
+          </p:nvPr>
+        </p:nvSpPr>
+        <p:spPr>
+          <a:xfrm>
+            <a:off x="428596" y="714356"/>
+            <a:ext cx="8215370" cy="6000792"/>
+          </a:xfrm>
+        </p:spPr>
+        <p:style>
+          <a:lnRef idx="1">
+            <a:schemeClr val="dk1"/>
+          </a:lnRef>
+          <a:fillRef idx="2">
+            <a:schemeClr val="dk1"/>
+          </a:fillRef>
+          <a:effectRef idx="1">
+            <a:schemeClr val="dk1"/>
+          </a:effectRef>
+          <a:fontRef idx="minor">
+            <a:schemeClr val="dk1"/>
+          </a:fontRef>
+        </p:style>
+        <p:txBody>
+          <a:bodyPr>
+            <a:noAutofit/>
+          </a:bodyPr>
+          <a:lstStyle/>
+          <a:p>
+            <a:pPr>
+              <a:buNone/>
+            </a:pPr>
+            <a:endParaRPr lang="ru-RU" sz="1500" b="1" dirty="0" smtClean="0">
+              <a:latin typeface="Arial" pitchFamily="34" charset="0"/>
+              <a:cs typeface="Arial" pitchFamily="34" charset="0"/>
+            </a:endParaRPr>
+          </a:p>
+          <a:p>
+            <a:pPr>
+              <a:buNone/>
+            </a:pPr>
+            <a:r>
+              <a:rPr lang="en-US" sz="1500" b="1" dirty="0">
+                <a:latin typeface="Arial" pitchFamily="34" charset="0"/>
+                <a:cs typeface="Arial" pitchFamily="34" charset="0"/>
+              </a:rPr>
+              <a:t>interface</a:t>
+            </a:r>
+            <a:r>
+              <a:rPr lang="en-US" sz="1500" dirty="0">
+                <a:latin typeface="Arial" pitchFamily="34" charset="0"/>
+                <a:cs typeface="Arial" pitchFamily="34" charset="0"/>
+              </a:rPr>
+              <a:t> Sayable{  </a:t>
+            </a:r>
+          </a:p>
+          <a:p>
+            <a:pPr>
+              <a:buNone/>
+            </a:pPr>
+            <a:r>
+              <a:rPr lang="en-US" sz="1500" dirty="0">
+                <a:latin typeface="Arial" pitchFamily="34" charset="0"/>
+                <a:cs typeface="Arial" pitchFamily="34" charset="0"/>
+              </a:rPr>
+              <a:t>    </a:t>
+            </a:r>
+            <a:r>
+              <a:rPr lang="en-US" sz="1500" b="1" dirty="0">
+                <a:latin typeface="Arial" pitchFamily="34" charset="0"/>
+                <a:cs typeface="Arial" pitchFamily="34" charset="0"/>
+              </a:rPr>
+              <a:t>public</a:t>
+            </a:r>
+            <a:r>
+              <a:rPr lang="en-US" sz="1500" dirty="0">
+                <a:latin typeface="Arial" pitchFamily="34" charset="0"/>
+                <a:cs typeface="Arial" pitchFamily="34" charset="0"/>
+              </a:rPr>
+              <a:t> String say(String name);  </a:t>
+            </a:r>
+          </a:p>
+          <a:p>
+            <a:pPr>
+              <a:buNone/>
+            </a:pPr>
+            <a:r>
+              <a:rPr lang="en-US" sz="1500" dirty="0">
+                <a:latin typeface="Arial" pitchFamily="34" charset="0"/>
+                <a:cs typeface="Arial" pitchFamily="34" charset="0"/>
+              </a:rPr>
+              <a:t>}  </a:t>
+            </a:r>
+          </a:p>
+          <a:p>
+            <a:pPr>
+              <a:buNone/>
+            </a:pPr>
+            <a:r>
+              <a:rPr lang="en-US" sz="1500" dirty="0">
+                <a:latin typeface="Arial" pitchFamily="34" charset="0"/>
+                <a:cs typeface="Arial" pitchFamily="34" charset="0"/>
+              </a:rPr>
+              <a:t>  </a:t>
+            </a:r>
+          </a:p>
+          <a:p>
+            <a:pPr>
+              <a:buNone/>
+            </a:pPr>
+            <a:r>
+              <a:rPr lang="en-US" sz="1500" b="1" dirty="0">
+                <a:latin typeface="Arial" pitchFamily="34" charset="0"/>
+                <a:cs typeface="Arial" pitchFamily="34" charset="0"/>
+              </a:rPr>
+              <a:t>public</a:t>
+            </a:r>
+            <a:r>
+              <a:rPr lang="en-US" sz="1500" dirty="0">
+                <a:latin typeface="Arial" pitchFamily="34" charset="0"/>
+                <a:cs typeface="Arial" pitchFamily="34" charset="0"/>
+              </a:rPr>
+              <a:t> </a:t>
+            </a:r>
+            <a:r>
+              <a:rPr lang="en-US" sz="1500" b="1" dirty="0">
+                <a:latin typeface="Arial" pitchFamily="34" charset="0"/>
+                <a:cs typeface="Arial" pitchFamily="34" charset="0"/>
+              </a:rPr>
+              <a:t>class</a:t>
+            </a:r>
+            <a:r>
+              <a:rPr lang="en-US" sz="1500" dirty="0">
+                <a:latin typeface="Arial" pitchFamily="34" charset="0"/>
+                <a:cs typeface="Arial" pitchFamily="34" charset="0"/>
+              </a:rPr>
+              <a:t> LambdaExpressionExample4{  </a:t>
+            </a:r>
+          </a:p>
+          <a:p>
+            <a:pPr>
+              <a:buNone/>
+            </a:pPr>
+            <a:r>
+              <a:rPr lang="en-US" sz="1500" dirty="0">
+                <a:latin typeface="Arial" pitchFamily="34" charset="0"/>
+                <a:cs typeface="Arial" pitchFamily="34" charset="0"/>
+              </a:rPr>
+              <a:t>    </a:t>
+            </a:r>
+            <a:r>
+              <a:rPr lang="en-US" sz="1500" b="1" dirty="0">
+                <a:latin typeface="Arial" pitchFamily="34" charset="0"/>
+                <a:cs typeface="Arial" pitchFamily="34" charset="0"/>
+              </a:rPr>
+              <a:t>public</a:t>
+            </a:r>
+            <a:r>
+              <a:rPr lang="en-US" sz="1500" dirty="0">
+                <a:latin typeface="Arial" pitchFamily="34" charset="0"/>
+                <a:cs typeface="Arial" pitchFamily="34" charset="0"/>
+              </a:rPr>
+              <a:t> </a:t>
+            </a:r>
+            <a:r>
+              <a:rPr lang="en-US" sz="1500" b="1" dirty="0">
+                <a:latin typeface="Arial" pitchFamily="34" charset="0"/>
+                <a:cs typeface="Arial" pitchFamily="34" charset="0"/>
+              </a:rPr>
+              <a:t>static</a:t>
+            </a:r>
+            <a:r>
+              <a:rPr lang="en-US" sz="1500" dirty="0">
+                <a:latin typeface="Arial" pitchFamily="34" charset="0"/>
+                <a:cs typeface="Arial" pitchFamily="34" charset="0"/>
+              </a:rPr>
+              <a:t> </a:t>
+            </a:r>
+            <a:r>
+              <a:rPr lang="en-US" sz="1500" b="1" dirty="0">
+                <a:latin typeface="Arial" pitchFamily="34" charset="0"/>
+                <a:cs typeface="Arial" pitchFamily="34" charset="0"/>
+              </a:rPr>
+              <a:t>void</a:t>
+            </a:r>
+            <a:r>
+              <a:rPr lang="en-US" sz="1500" dirty="0">
+                <a:latin typeface="Arial" pitchFamily="34" charset="0"/>
+                <a:cs typeface="Arial" pitchFamily="34" charset="0"/>
+              </a:rPr>
+              <a:t> main(String[] args) {  </a:t>
+            </a:r>
+          </a:p>
+          <a:p>
+            <a:pPr>
+              <a:buNone/>
+            </a:pPr>
+            <a:r>
+              <a:rPr lang="en-US" sz="1500" dirty="0">
+                <a:latin typeface="Arial" pitchFamily="34" charset="0"/>
+                <a:cs typeface="Arial" pitchFamily="34" charset="0"/>
+              </a:rPr>
+              <a:t>      </a:t>
+            </a:r>
+          </a:p>
+          <a:p>
+            <a:pPr>
+              <a:buNone/>
+            </a:pPr>
+            <a:r>
+              <a:rPr lang="en-US" sz="1500" dirty="0">
+                <a:latin typeface="Arial" pitchFamily="34" charset="0"/>
+                <a:cs typeface="Arial" pitchFamily="34" charset="0"/>
+              </a:rPr>
+              <a:t>       </a:t>
+            </a:r>
+            <a:r>
+              <a:rPr lang="en-US" sz="1500" dirty="0">
+                <a:solidFill>
+                  <a:srgbClr val="00B050"/>
+                </a:solidFill>
+                <a:latin typeface="Arial" pitchFamily="34" charset="0"/>
+                <a:cs typeface="Arial" pitchFamily="34" charset="0"/>
+              </a:rPr>
+              <a:t> // Lambda expression with single parameter.</a:t>
+            </a:r>
+            <a:r>
+              <a:rPr lang="en-US" sz="1500" dirty="0">
+                <a:latin typeface="Arial" pitchFamily="34" charset="0"/>
+                <a:cs typeface="Arial" pitchFamily="34" charset="0"/>
+              </a:rPr>
+              <a:t>  </a:t>
+            </a:r>
+          </a:p>
+          <a:p>
+            <a:pPr>
+              <a:buNone/>
+            </a:pPr>
+            <a:r>
+              <a:rPr lang="en-US" sz="1500" dirty="0">
+                <a:latin typeface="Arial" pitchFamily="34" charset="0"/>
+                <a:cs typeface="Arial" pitchFamily="34" charset="0"/>
+              </a:rPr>
+              <a:t>        Sayable s1=(name)-&gt;{  </a:t>
+            </a:r>
+          </a:p>
+          <a:p>
+            <a:pPr>
+              <a:buNone/>
+            </a:pPr>
+            <a:r>
+              <a:rPr lang="en-US" sz="1500" dirty="0">
+                <a:latin typeface="Arial" pitchFamily="34" charset="0"/>
+                <a:cs typeface="Arial" pitchFamily="34" charset="0"/>
+              </a:rPr>
+              <a:t>            </a:t>
+            </a:r>
+            <a:r>
+              <a:rPr lang="en-US" sz="1500" b="1" dirty="0">
+                <a:latin typeface="Arial" pitchFamily="34" charset="0"/>
+                <a:cs typeface="Arial" pitchFamily="34" charset="0"/>
+              </a:rPr>
+              <a:t>return</a:t>
+            </a:r>
+            <a:r>
+              <a:rPr lang="en-US" sz="1500" dirty="0">
+                <a:latin typeface="Arial" pitchFamily="34" charset="0"/>
+                <a:cs typeface="Arial" pitchFamily="34" charset="0"/>
+              </a:rPr>
+              <a:t> "</a:t>
+            </a:r>
+            <a:r>
+              <a:rPr lang="en-US" sz="1500" dirty="0">
+                <a:solidFill>
+                  <a:schemeClr val="accent5"/>
+                </a:solidFill>
+                <a:latin typeface="Arial" pitchFamily="34" charset="0"/>
+                <a:cs typeface="Arial" pitchFamily="34" charset="0"/>
+              </a:rPr>
+              <a:t>Hello,</a:t>
+            </a:r>
+            <a:r>
+              <a:rPr lang="en-US" sz="1500" dirty="0">
+                <a:latin typeface="Arial" pitchFamily="34" charset="0"/>
+                <a:cs typeface="Arial" pitchFamily="34" charset="0"/>
+              </a:rPr>
+              <a:t> "+name;  </a:t>
+            </a:r>
+          </a:p>
+          <a:p>
+            <a:pPr>
+              <a:buNone/>
+            </a:pPr>
+            <a:r>
+              <a:rPr lang="en-US" sz="1500" dirty="0">
+                <a:latin typeface="Arial" pitchFamily="34" charset="0"/>
+                <a:cs typeface="Arial" pitchFamily="34" charset="0"/>
+              </a:rPr>
+              <a:t>        };  </a:t>
+            </a:r>
+          </a:p>
+          <a:p>
+            <a:pPr>
+              <a:buNone/>
+            </a:pPr>
+            <a:r>
+              <a:rPr lang="en-US" sz="1500" dirty="0">
+                <a:latin typeface="Arial" pitchFamily="34" charset="0"/>
+                <a:cs typeface="Arial" pitchFamily="34" charset="0"/>
+              </a:rPr>
+              <a:t>        System.out.println(s1.say</a:t>
+            </a:r>
+            <a:r>
+              <a:rPr lang="en-US" sz="1500" dirty="0">
+                <a:solidFill>
+                  <a:schemeClr val="accent5"/>
+                </a:solidFill>
+                <a:latin typeface="Arial" pitchFamily="34" charset="0"/>
+                <a:cs typeface="Arial" pitchFamily="34" charset="0"/>
+              </a:rPr>
+              <a:t>("Sonoo</a:t>
+            </a:r>
+            <a:r>
+              <a:rPr lang="en-US" sz="1500" dirty="0">
+                <a:latin typeface="Arial" pitchFamily="34" charset="0"/>
+                <a:cs typeface="Arial" pitchFamily="34" charset="0"/>
+              </a:rPr>
+              <a:t>"));  </a:t>
+            </a:r>
+          </a:p>
+          <a:p>
+            <a:pPr>
+              <a:buNone/>
+            </a:pPr>
+            <a:r>
+              <a:rPr lang="en-US" sz="1500" dirty="0">
+                <a:latin typeface="Arial" pitchFamily="34" charset="0"/>
+                <a:cs typeface="Arial" pitchFamily="34" charset="0"/>
+              </a:rPr>
+              <a:t>          </a:t>
+            </a:r>
+          </a:p>
+          <a:p>
+            <a:pPr>
+              <a:buNone/>
+            </a:pPr>
+            <a:r>
+              <a:rPr lang="en-US" sz="1500" dirty="0">
+                <a:latin typeface="Arial" pitchFamily="34" charset="0"/>
+                <a:cs typeface="Arial" pitchFamily="34" charset="0"/>
+              </a:rPr>
+              <a:t>        </a:t>
+            </a:r>
+            <a:r>
+              <a:rPr lang="en-US" sz="1500" dirty="0">
+                <a:solidFill>
+                  <a:srgbClr val="00B050"/>
+                </a:solidFill>
+                <a:latin typeface="Arial" pitchFamily="34" charset="0"/>
+                <a:cs typeface="Arial" pitchFamily="34" charset="0"/>
+              </a:rPr>
+              <a:t>// You can omit function parentheses</a:t>
+            </a:r>
+            <a:r>
+              <a:rPr lang="en-US" sz="1500" dirty="0">
+                <a:latin typeface="Arial" pitchFamily="34" charset="0"/>
+                <a:cs typeface="Arial" pitchFamily="34" charset="0"/>
+              </a:rPr>
+              <a:t>    </a:t>
+            </a:r>
+          </a:p>
+          <a:p>
+            <a:pPr>
+              <a:buNone/>
+            </a:pPr>
+            <a:r>
+              <a:rPr lang="en-US" sz="1500" dirty="0">
+                <a:latin typeface="Arial" pitchFamily="34" charset="0"/>
+                <a:cs typeface="Arial" pitchFamily="34" charset="0"/>
+              </a:rPr>
+              <a:t>        Sayable s2= name -&gt;{  </a:t>
+            </a:r>
+          </a:p>
+          <a:p>
+            <a:pPr>
+              <a:buNone/>
+            </a:pPr>
+            <a:r>
+              <a:rPr lang="en-US" sz="1500" dirty="0">
+                <a:latin typeface="Arial" pitchFamily="34" charset="0"/>
+                <a:cs typeface="Arial" pitchFamily="34" charset="0"/>
+              </a:rPr>
+              <a:t>            </a:t>
+            </a:r>
+            <a:r>
+              <a:rPr lang="en-US" sz="1500" b="1" dirty="0">
+                <a:latin typeface="Arial" pitchFamily="34" charset="0"/>
+                <a:cs typeface="Arial" pitchFamily="34" charset="0"/>
+              </a:rPr>
+              <a:t>return</a:t>
+            </a:r>
+            <a:r>
+              <a:rPr lang="en-US" sz="1500" dirty="0">
+                <a:latin typeface="Arial" pitchFamily="34" charset="0"/>
+                <a:cs typeface="Arial" pitchFamily="34" charset="0"/>
+              </a:rPr>
+              <a:t> "</a:t>
+            </a:r>
+            <a:r>
+              <a:rPr lang="en-US" sz="1500" dirty="0">
+                <a:solidFill>
+                  <a:schemeClr val="accent5"/>
+                </a:solidFill>
+                <a:latin typeface="Arial" pitchFamily="34" charset="0"/>
+                <a:cs typeface="Arial" pitchFamily="34" charset="0"/>
+              </a:rPr>
+              <a:t>Hello,</a:t>
+            </a:r>
+            <a:r>
+              <a:rPr lang="en-US" sz="1500" dirty="0">
+                <a:latin typeface="Arial" pitchFamily="34" charset="0"/>
+                <a:cs typeface="Arial" pitchFamily="34" charset="0"/>
+              </a:rPr>
+              <a:t> "+name;  </a:t>
+            </a:r>
+          </a:p>
+          <a:p>
+            <a:pPr>
+              <a:buNone/>
+            </a:pPr>
+            <a:r>
+              <a:rPr lang="en-US" sz="1500" dirty="0">
+                <a:latin typeface="Arial" pitchFamily="34" charset="0"/>
+                <a:cs typeface="Arial" pitchFamily="34" charset="0"/>
+              </a:rPr>
+              <a:t>        };  </a:t>
+            </a:r>
+          </a:p>
+          <a:p>
+            <a:pPr>
+              <a:buNone/>
+            </a:pPr>
+            <a:r>
+              <a:rPr lang="en-US" sz="1500" dirty="0">
+                <a:latin typeface="Arial" pitchFamily="34" charset="0"/>
+                <a:cs typeface="Arial" pitchFamily="34" charset="0"/>
+              </a:rPr>
+              <a:t>        System.out.println(s2.say("</a:t>
+            </a:r>
+            <a:r>
+              <a:rPr lang="en-US" sz="1500" dirty="0">
+                <a:solidFill>
+                  <a:schemeClr val="accent5"/>
+                </a:solidFill>
+                <a:latin typeface="Arial" pitchFamily="34" charset="0"/>
+                <a:cs typeface="Arial" pitchFamily="34" charset="0"/>
+              </a:rPr>
+              <a:t>Sonoo</a:t>
+            </a:r>
+            <a:r>
+              <a:rPr lang="en-US" sz="1500" dirty="0">
+                <a:latin typeface="Arial" pitchFamily="34" charset="0"/>
+                <a:cs typeface="Arial" pitchFamily="34" charset="0"/>
+              </a:rPr>
+              <a:t>"));  </a:t>
+            </a:r>
+          </a:p>
+          <a:p>
+            <a:pPr>
+              <a:buNone/>
+            </a:pPr>
+            <a:r>
+              <a:rPr lang="en-US" sz="1500" dirty="0">
+                <a:latin typeface="Arial" pitchFamily="34" charset="0"/>
+                <a:cs typeface="Arial" pitchFamily="34" charset="0"/>
+              </a:rPr>
+              <a:t>    }  </a:t>
+            </a:r>
+          </a:p>
+          <a:p>
+            <a:pPr>
+              <a:buNone/>
+            </a:pPr>
+            <a:r>
+              <a:rPr lang="en-US" sz="1500" dirty="0">
+                <a:latin typeface="Arial" pitchFamily="34" charset="0"/>
+                <a:cs typeface="Arial" pitchFamily="34" charset="0"/>
+              </a:rPr>
+              <a:t>}  </a:t>
+            </a:r>
+          </a:p>
+        </p:txBody>
+      </p:sp>
+    </p:spTree>
+  </p:cSld>
+  <p:clrMapOvr>
+    <a:masterClrMapping/>
+  </p:clrMapOvr>
+</p:sld>
+</file>
+
+<file path=ppt/slides/slide9.xml><?xml version="1.0" encoding="utf-8"?>
+<p:sld xmlns:a="http://schemas.openxmlformats.org/drawingml/2006/main" xmlns:r="http://schemas.openxmlformats.org/officeDocument/2006/relationships" xmlns:p="http://schemas.openxmlformats.org/presentationml/2006/main">
+  <p:cSld>
+    <p:spTree>
+      <p:nvGrpSpPr>
+        <p:cNvPr id="1" name=""/>
+        <p:cNvGrpSpPr/>
+        <p:nvPr/>
+      </p:nvGrpSpPr>
+      <p:grpSpPr>
+        <a:xfrm>
+          <a:off x="0" y="0"/>
+          <a:ext cx="0" cy="0"/>
+          <a:chOff x="0" y="0"/>
+          <a:chExt cx="0" cy="0"/>
+        </a:xfrm>
+      </p:grpSpPr>
+      <p:sp>
+        <p:nvSpPr>
+          <p:cNvPr id="5" name="Текст 4"/>
+          <p:cNvSpPr>
+            <a:spLocks noGrp="1"/>
+          </p:cNvSpPr>
+          <p:nvPr>
+            <p:ph type="body" idx="1"/>
+          </p:nvPr>
+        </p:nvSpPr>
+        <p:spPr>
+          <a:xfrm>
+            <a:off x="2000232" y="0"/>
+            <a:ext cx="5643602" cy="639762"/>
+          </a:xfrm>
+        </p:spPr>
+        <p:txBody>
+          <a:bodyPr>
+            <a:normAutofit/>
+          </a:bodyPr>
+          <a:lstStyle/>
+          <a:p>
+            <a:pPr algn="ctr"/>
+            <a:r>
+              <a:rPr lang="en-US" dirty="0">
+                <a:solidFill>
+                  <a:srgbClr val="7030A0"/>
+                </a:solidFill>
+              </a:rPr>
+              <a:t>L</a:t>
+            </a:r>
+            <a:r>
+              <a:rPr lang="en-US" dirty="0" smtClean="0">
+                <a:solidFill>
+                  <a:srgbClr val="7030A0"/>
+                </a:solidFill>
+              </a:rPr>
+              <a:t>ambda expression: multiple parameters</a:t>
+            </a:r>
+            <a:endParaRPr lang="uk-UA" dirty="0">
+              <a:solidFill>
+                <a:srgbClr val="7030A0"/>
+              </a:solidFill>
+            </a:endParaRPr>
+          </a:p>
+        </p:txBody>
+      </p:sp>
+      <p:sp>
+        <p:nvSpPr>
+          <p:cNvPr id="6" name="Содержимое 5"/>
+          <p:cNvSpPr>
+            <a:spLocks noGrp="1"/>
+          </p:cNvSpPr>
+          <p:nvPr>
+            <p:ph sz="half" idx="2"/>
+          </p:nvPr>
+        </p:nvSpPr>
+        <p:spPr>
+          <a:xfrm>
+            <a:off x="428596" y="714356"/>
+            <a:ext cx="8215370" cy="6000792"/>
+          </a:xfrm>
+        </p:spPr>
+        <p:style>
+          <a:lnRef idx="1">
+            <a:schemeClr val="dk1"/>
+          </a:lnRef>
+          <a:fillRef idx="2">
+            <a:schemeClr val="dk1"/>
+          </a:fillRef>
+          <a:effectRef idx="1">
+            <a:schemeClr val="dk1"/>
+          </a:effectRef>
+          <a:fontRef idx="minor">
+            <a:schemeClr val="dk1"/>
+          </a:fontRef>
+        </p:style>
+        <p:txBody>
+          <a:bodyPr>
+            <a:noAutofit/>
+          </a:bodyPr>
+          <a:lstStyle/>
+          <a:p>
+            <a:pPr>
+              <a:buNone/>
+            </a:pPr>
+            <a:endParaRPr lang="ru-RU" sz="1900" b="1" dirty="0" smtClean="0">
+              <a:latin typeface="Arial" pitchFamily="34" charset="0"/>
+              <a:cs typeface="Arial" pitchFamily="34" charset="0"/>
+            </a:endParaRPr>
+          </a:p>
+          <a:p>
+            <a:pPr>
+              <a:buNone/>
+            </a:pPr>
+            <a:r>
+              <a:rPr lang="en-US" sz="1900" b="1" dirty="0">
+                <a:latin typeface="Arial" pitchFamily="34" charset="0"/>
+                <a:cs typeface="Arial" pitchFamily="34" charset="0"/>
+              </a:rPr>
+              <a:t>interface</a:t>
+            </a:r>
+            <a:r>
+              <a:rPr lang="en-US" sz="1900" dirty="0">
+                <a:latin typeface="Arial" pitchFamily="34" charset="0"/>
+                <a:cs typeface="Arial" pitchFamily="34" charset="0"/>
+              </a:rPr>
+              <a:t> Addable{  </a:t>
+            </a:r>
+          </a:p>
+          <a:p>
+            <a:pPr>
+              <a:buNone/>
+            </a:pPr>
+            <a:r>
+              <a:rPr lang="en-US" sz="1900" dirty="0">
+                <a:latin typeface="Arial" pitchFamily="34" charset="0"/>
+                <a:cs typeface="Arial" pitchFamily="34" charset="0"/>
+              </a:rPr>
+              <a:t>    </a:t>
+            </a:r>
+            <a:r>
+              <a:rPr lang="en-US" sz="1900" b="1" dirty="0">
+                <a:latin typeface="Arial" pitchFamily="34" charset="0"/>
+                <a:cs typeface="Arial" pitchFamily="34" charset="0"/>
+              </a:rPr>
+              <a:t>int</a:t>
+            </a:r>
+            <a:r>
+              <a:rPr lang="en-US" sz="1900" dirty="0">
+                <a:latin typeface="Arial" pitchFamily="34" charset="0"/>
+                <a:cs typeface="Arial" pitchFamily="34" charset="0"/>
+              </a:rPr>
+              <a:t> add(</a:t>
+            </a:r>
+            <a:r>
+              <a:rPr lang="en-US" sz="1900" b="1" dirty="0">
+                <a:latin typeface="Arial" pitchFamily="34" charset="0"/>
+                <a:cs typeface="Arial" pitchFamily="34" charset="0"/>
+              </a:rPr>
+              <a:t>int</a:t>
+            </a:r>
+            <a:r>
+              <a:rPr lang="en-US" sz="1900" dirty="0">
+                <a:latin typeface="Arial" pitchFamily="34" charset="0"/>
+                <a:cs typeface="Arial" pitchFamily="34" charset="0"/>
+              </a:rPr>
+              <a:t> </a:t>
+            </a:r>
+            <a:r>
+              <a:rPr lang="en-US" sz="1900" dirty="0" err="1">
+                <a:latin typeface="Arial" pitchFamily="34" charset="0"/>
+                <a:cs typeface="Arial" pitchFamily="34" charset="0"/>
+              </a:rPr>
+              <a:t>a,</a:t>
+            </a:r>
+            <a:r>
+              <a:rPr lang="en-US" sz="1900" b="1" dirty="0" err="1">
+                <a:latin typeface="Arial" pitchFamily="34" charset="0"/>
+                <a:cs typeface="Arial" pitchFamily="34" charset="0"/>
+              </a:rPr>
+              <a:t>int</a:t>
+            </a:r>
+            <a:r>
+              <a:rPr lang="en-US" sz="1900" dirty="0">
+                <a:latin typeface="Arial" pitchFamily="34" charset="0"/>
+                <a:cs typeface="Arial" pitchFamily="34" charset="0"/>
+              </a:rPr>
+              <a:t> b);  </a:t>
+            </a:r>
+          </a:p>
+          <a:p>
+            <a:pPr>
+              <a:buNone/>
+            </a:pPr>
+            <a:r>
+              <a:rPr lang="en-US" sz="1900" dirty="0">
+                <a:latin typeface="Arial" pitchFamily="34" charset="0"/>
+                <a:cs typeface="Arial" pitchFamily="34" charset="0"/>
+              </a:rPr>
+              <a:t>}  </a:t>
+            </a:r>
+          </a:p>
+          <a:p>
+            <a:pPr>
+              <a:buNone/>
+            </a:pPr>
+            <a:r>
+              <a:rPr lang="en-US" sz="1900" dirty="0">
+                <a:latin typeface="Arial" pitchFamily="34" charset="0"/>
+                <a:cs typeface="Arial" pitchFamily="34" charset="0"/>
+              </a:rPr>
+              <a:t>  </a:t>
+            </a:r>
+          </a:p>
+          <a:p>
+            <a:pPr>
+              <a:buNone/>
+            </a:pPr>
+            <a:r>
+              <a:rPr lang="en-US" sz="1900" b="1" dirty="0">
+                <a:latin typeface="Arial" pitchFamily="34" charset="0"/>
+                <a:cs typeface="Arial" pitchFamily="34" charset="0"/>
+              </a:rPr>
+              <a:t>public</a:t>
+            </a:r>
+            <a:r>
+              <a:rPr lang="en-US" sz="1900" dirty="0">
+                <a:latin typeface="Arial" pitchFamily="34" charset="0"/>
+                <a:cs typeface="Arial" pitchFamily="34" charset="0"/>
+              </a:rPr>
+              <a:t> </a:t>
+            </a:r>
+            <a:r>
+              <a:rPr lang="en-US" sz="1900" b="1" dirty="0">
+                <a:latin typeface="Arial" pitchFamily="34" charset="0"/>
+                <a:cs typeface="Arial" pitchFamily="34" charset="0"/>
+              </a:rPr>
+              <a:t>class</a:t>
+            </a:r>
+            <a:r>
+              <a:rPr lang="en-US" sz="1900" dirty="0">
+                <a:latin typeface="Arial" pitchFamily="34" charset="0"/>
+                <a:cs typeface="Arial" pitchFamily="34" charset="0"/>
+              </a:rPr>
+              <a:t> LambdaExpressionExample5{  </a:t>
+            </a:r>
+          </a:p>
+          <a:p>
+            <a:pPr>
+              <a:buNone/>
+            </a:pPr>
+            <a:r>
+              <a:rPr lang="en-US" sz="1900" dirty="0">
+                <a:latin typeface="Arial" pitchFamily="34" charset="0"/>
+                <a:cs typeface="Arial" pitchFamily="34" charset="0"/>
+              </a:rPr>
+              <a:t>    </a:t>
+            </a:r>
+            <a:r>
+              <a:rPr lang="en-US" sz="1900" b="1" dirty="0">
+                <a:latin typeface="Arial" pitchFamily="34" charset="0"/>
+                <a:cs typeface="Arial" pitchFamily="34" charset="0"/>
+              </a:rPr>
+              <a:t>public</a:t>
+            </a:r>
+            <a:r>
+              <a:rPr lang="en-US" sz="1900" dirty="0">
+                <a:latin typeface="Arial" pitchFamily="34" charset="0"/>
+                <a:cs typeface="Arial" pitchFamily="34" charset="0"/>
+              </a:rPr>
+              <a:t> </a:t>
+            </a:r>
+            <a:r>
+              <a:rPr lang="en-US" sz="1900" b="1" dirty="0">
+                <a:latin typeface="Arial" pitchFamily="34" charset="0"/>
+                <a:cs typeface="Arial" pitchFamily="34" charset="0"/>
+              </a:rPr>
+              <a:t>static</a:t>
+            </a:r>
+            <a:r>
+              <a:rPr lang="en-US" sz="1900" dirty="0">
+                <a:latin typeface="Arial" pitchFamily="34" charset="0"/>
+                <a:cs typeface="Arial" pitchFamily="34" charset="0"/>
+              </a:rPr>
+              <a:t> </a:t>
+            </a:r>
+            <a:r>
+              <a:rPr lang="en-US" sz="1900" b="1" dirty="0">
+                <a:latin typeface="Arial" pitchFamily="34" charset="0"/>
+                <a:cs typeface="Arial" pitchFamily="34" charset="0"/>
+              </a:rPr>
+              <a:t>void</a:t>
+            </a:r>
+            <a:r>
+              <a:rPr lang="en-US" sz="1900" dirty="0">
+                <a:latin typeface="Arial" pitchFamily="34" charset="0"/>
+                <a:cs typeface="Arial" pitchFamily="34" charset="0"/>
+              </a:rPr>
+              <a:t> main(String[] args) {  </a:t>
+            </a:r>
+          </a:p>
+          <a:p>
+            <a:pPr>
+              <a:buNone/>
+            </a:pPr>
+            <a:r>
+              <a:rPr lang="en-US" sz="1900" dirty="0">
+                <a:latin typeface="Arial" pitchFamily="34" charset="0"/>
+                <a:cs typeface="Arial" pitchFamily="34" charset="0"/>
+              </a:rPr>
+              <a:t>          </a:t>
+            </a:r>
+          </a:p>
+          <a:p>
+            <a:pPr>
+              <a:buNone/>
+            </a:pPr>
+            <a:r>
+              <a:rPr lang="en-US" sz="1900" dirty="0">
+                <a:latin typeface="Arial" pitchFamily="34" charset="0"/>
+                <a:cs typeface="Arial" pitchFamily="34" charset="0"/>
+              </a:rPr>
+              <a:t>        </a:t>
+            </a:r>
+            <a:r>
+              <a:rPr lang="en-US" sz="1900" dirty="0">
+                <a:solidFill>
+                  <a:srgbClr val="00B050"/>
+                </a:solidFill>
+                <a:latin typeface="Arial" pitchFamily="34" charset="0"/>
+                <a:cs typeface="Arial" pitchFamily="34" charset="0"/>
+              </a:rPr>
+              <a:t>// Multiple parameters in lambda expression  </a:t>
+            </a:r>
+          </a:p>
+          <a:p>
+            <a:pPr>
+              <a:buNone/>
+            </a:pPr>
+            <a:r>
+              <a:rPr lang="en-US" sz="1900" dirty="0">
+                <a:latin typeface="Arial" pitchFamily="34" charset="0"/>
+                <a:cs typeface="Arial" pitchFamily="34" charset="0"/>
+              </a:rPr>
+              <a:t>        Addable ad1=(</a:t>
+            </a:r>
+            <a:r>
+              <a:rPr lang="en-US" sz="1900" dirty="0" err="1">
+                <a:latin typeface="Arial" pitchFamily="34" charset="0"/>
+                <a:cs typeface="Arial" pitchFamily="34" charset="0"/>
+              </a:rPr>
+              <a:t>a,b</a:t>
+            </a:r>
+            <a:r>
+              <a:rPr lang="en-US" sz="1900" dirty="0">
+                <a:latin typeface="Arial" pitchFamily="34" charset="0"/>
+                <a:cs typeface="Arial" pitchFamily="34" charset="0"/>
+              </a:rPr>
+              <a:t>)-&gt;(</a:t>
+            </a:r>
+            <a:r>
+              <a:rPr lang="en-US" sz="1900" dirty="0" err="1">
+                <a:latin typeface="Arial" pitchFamily="34" charset="0"/>
+                <a:cs typeface="Arial" pitchFamily="34" charset="0"/>
+              </a:rPr>
+              <a:t>a+b</a:t>
+            </a:r>
+            <a:r>
+              <a:rPr lang="en-US" sz="1900" dirty="0">
+                <a:latin typeface="Arial" pitchFamily="34" charset="0"/>
+                <a:cs typeface="Arial" pitchFamily="34" charset="0"/>
+              </a:rPr>
+              <a:t>);  </a:t>
+            </a:r>
+          </a:p>
+          <a:p>
+            <a:pPr>
+              <a:buNone/>
+            </a:pPr>
+            <a:r>
+              <a:rPr lang="en-US" sz="1900" dirty="0">
+                <a:latin typeface="Arial" pitchFamily="34" charset="0"/>
+                <a:cs typeface="Arial" pitchFamily="34" charset="0"/>
+              </a:rPr>
+              <a:t>        System.out.println(ad1.add(10,20));  </a:t>
+            </a:r>
+          </a:p>
+          <a:p>
+            <a:pPr>
+              <a:buNone/>
+            </a:pPr>
+            <a:r>
+              <a:rPr lang="en-US" sz="1900" dirty="0">
+                <a:latin typeface="Arial" pitchFamily="34" charset="0"/>
+                <a:cs typeface="Arial" pitchFamily="34" charset="0"/>
+              </a:rPr>
+              <a:t>          </a:t>
+            </a:r>
+          </a:p>
+          <a:p>
+            <a:pPr>
+              <a:buNone/>
+            </a:pPr>
+            <a:r>
+              <a:rPr lang="en-US" sz="1900" dirty="0">
+                <a:latin typeface="Arial" pitchFamily="34" charset="0"/>
+                <a:cs typeface="Arial" pitchFamily="34" charset="0"/>
+              </a:rPr>
+              <a:t>       </a:t>
+            </a:r>
+            <a:r>
+              <a:rPr lang="en-US" sz="1900" dirty="0">
+                <a:solidFill>
+                  <a:srgbClr val="00B050"/>
+                </a:solidFill>
+                <a:latin typeface="Arial" pitchFamily="34" charset="0"/>
+                <a:cs typeface="Arial" pitchFamily="34" charset="0"/>
+              </a:rPr>
+              <a:t> // Multiple parameters with data type in lambda expression</a:t>
+            </a:r>
+            <a:r>
+              <a:rPr lang="en-US" sz="1900" dirty="0">
+                <a:latin typeface="Arial" pitchFamily="34" charset="0"/>
+                <a:cs typeface="Arial" pitchFamily="34" charset="0"/>
+              </a:rPr>
+              <a:t>  </a:t>
+            </a:r>
+          </a:p>
+          <a:p>
+            <a:pPr>
+              <a:buNone/>
+            </a:pPr>
+            <a:r>
+              <a:rPr lang="en-US" sz="1900" dirty="0">
+                <a:latin typeface="Arial" pitchFamily="34" charset="0"/>
+                <a:cs typeface="Arial" pitchFamily="34" charset="0"/>
+              </a:rPr>
+              <a:t>        Addable ad2=(</a:t>
+            </a:r>
+            <a:r>
+              <a:rPr lang="en-US" sz="1900" b="1" dirty="0">
+                <a:latin typeface="Arial" pitchFamily="34" charset="0"/>
+                <a:cs typeface="Arial" pitchFamily="34" charset="0"/>
+              </a:rPr>
+              <a:t>int</a:t>
+            </a:r>
+            <a:r>
+              <a:rPr lang="en-US" sz="1900" dirty="0">
+                <a:latin typeface="Arial" pitchFamily="34" charset="0"/>
+                <a:cs typeface="Arial" pitchFamily="34" charset="0"/>
+              </a:rPr>
+              <a:t> </a:t>
+            </a:r>
+            <a:r>
+              <a:rPr lang="en-US" sz="1900" dirty="0" err="1">
+                <a:latin typeface="Arial" pitchFamily="34" charset="0"/>
+                <a:cs typeface="Arial" pitchFamily="34" charset="0"/>
+              </a:rPr>
+              <a:t>a,</a:t>
+            </a:r>
+            <a:r>
+              <a:rPr lang="en-US" sz="1900" b="1" dirty="0" err="1">
+                <a:latin typeface="Arial" pitchFamily="34" charset="0"/>
+                <a:cs typeface="Arial" pitchFamily="34" charset="0"/>
+              </a:rPr>
+              <a:t>int</a:t>
+            </a:r>
+            <a:r>
+              <a:rPr lang="en-US" sz="1900" dirty="0">
+                <a:latin typeface="Arial" pitchFamily="34" charset="0"/>
+                <a:cs typeface="Arial" pitchFamily="34" charset="0"/>
+              </a:rPr>
+              <a:t> b)-&gt;(</a:t>
+            </a:r>
+            <a:r>
+              <a:rPr lang="en-US" sz="1900" dirty="0" err="1">
+                <a:latin typeface="Arial" pitchFamily="34" charset="0"/>
+                <a:cs typeface="Arial" pitchFamily="34" charset="0"/>
+              </a:rPr>
+              <a:t>a+b</a:t>
+            </a:r>
+            <a:r>
+              <a:rPr lang="en-US" sz="1900" dirty="0">
+                <a:latin typeface="Arial" pitchFamily="34" charset="0"/>
+                <a:cs typeface="Arial" pitchFamily="34" charset="0"/>
+              </a:rPr>
+              <a:t>);  </a:t>
+            </a:r>
+          </a:p>
+          <a:p>
+            <a:pPr>
+              <a:buNone/>
+            </a:pPr>
+            <a:r>
+              <a:rPr lang="en-US" sz="1900" dirty="0">
+                <a:latin typeface="Arial" pitchFamily="34" charset="0"/>
+                <a:cs typeface="Arial" pitchFamily="34" charset="0"/>
+              </a:rPr>
+              <a:t>        System.out.println(ad2.add(100,200));  </a:t>
+            </a:r>
+          </a:p>
+          <a:p>
+            <a:pPr>
+              <a:buNone/>
+            </a:pPr>
+            <a:r>
+              <a:rPr lang="en-US" sz="1900" dirty="0">
+                <a:latin typeface="Arial" pitchFamily="34" charset="0"/>
+                <a:cs typeface="Arial" pitchFamily="34" charset="0"/>
+              </a:rPr>
+              <a:t>    }  </a:t>
+            </a:r>
+          </a:p>
+          <a:p>
+            <a:pPr>
+              <a:buNone/>
+            </a:pPr>
+            <a:r>
+              <a:rPr lang="en-US" sz="1900" dirty="0">
                 <a:latin typeface="Arial" pitchFamily="34" charset="0"/>
                 <a:cs typeface="Arial" pitchFamily="34" charset="0"/>
               </a:rPr>

</xml_diff>

<commit_message>
added 2 slides with foreach loop and creating threads examples
</commit_message>
<xml_diff>
--- a/lambdas.pptx
+++ b/lambdas.pptx
@@ -15,6 +15,8 @@
     <p:sldId id="263" r:id="rId9"/>
     <p:sldId id="264" r:id="rId10"/>
     <p:sldId id="265" r:id="rId11"/>
+    <p:sldId id="266" r:id="rId12"/>
+    <p:sldId id="267" r:id="rId13"/>
   </p:sldIdLst>
   <p:sldSz cx="9144000" cy="6858000" type="screen4x3"/>
   <p:notesSz cx="6858000" cy="9144000"/>
@@ -3694,6 +3696,875 @@
                 <a:cs typeface="Arial" pitchFamily="34" charset="0"/>
               </a:rPr>
               <a:t>}  </a:t>
+            </a:r>
+          </a:p>
+        </p:txBody>
+      </p:sp>
+    </p:spTree>
+  </p:cSld>
+  <p:clrMapOvr>
+    <a:masterClrMapping/>
+  </p:clrMapOvr>
+</p:sld>
+</file>
+
+<file path=ppt/slides/slide11.xml><?xml version="1.0" encoding="utf-8"?>
+<p:sld xmlns:a="http://schemas.openxmlformats.org/drawingml/2006/main" xmlns:r="http://schemas.openxmlformats.org/officeDocument/2006/relationships" xmlns:p="http://schemas.openxmlformats.org/presentationml/2006/main">
+  <p:cSld>
+    <p:spTree>
+      <p:nvGrpSpPr>
+        <p:cNvPr id="1" name=""/>
+        <p:cNvGrpSpPr/>
+        <p:nvPr/>
+      </p:nvGrpSpPr>
+      <p:grpSpPr>
+        <a:xfrm>
+          <a:off x="0" y="0"/>
+          <a:ext cx="0" cy="0"/>
+          <a:chOff x="0" y="0"/>
+          <a:chExt cx="0" cy="0"/>
+        </a:xfrm>
+      </p:grpSpPr>
+      <p:sp>
+        <p:nvSpPr>
+          <p:cNvPr id="5" name="Текст 4"/>
+          <p:cNvSpPr>
+            <a:spLocks noGrp="1"/>
+          </p:cNvSpPr>
+          <p:nvPr>
+            <p:ph type="body" idx="1"/>
+          </p:nvPr>
+        </p:nvSpPr>
+        <p:spPr>
+          <a:xfrm>
+            <a:off x="2000232" y="142852"/>
+            <a:ext cx="5643602" cy="639762"/>
+          </a:xfrm>
+        </p:spPr>
+        <p:txBody>
+          <a:bodyPr>
+            <a:normAutofit/>
+          </a:bodyPr>
+          <a:lstStyle/>
+          <a:p>
+            <a:pPr algn="ctr"/>
+            <a:r>
+              <a:rPr lang="en-US" dirty="0">
+                <a:solidFill>
+                  <a:srgbClr val="7030A0"/>
+                </a:solidFill>
+              </a:rPr>
+              <a:t>L</a:t>
+            </a:r>
+            <a:r>
+              <a:rPr lang="en-US" dirty="0" smtClean="0">
+                <a:solidFill>
+                  <a:srgbClr val="7030A0"/>
+                </a:solidFill>
+              </a:rPr>
+              <a:t>ambda expression example: </a:t>
+            </a:r>
+            <a:r>
+              <a:rPr lang="en-US" dirty="0">
+                <a:solidFill>
+                  <a:srgbClr val="7030A0"/>
+                </a:solidFill>
+              </a:rPr>
+              <a:t>F</a:t>
+            </a:r>
+            <a:r>
+              <a:rPr lang="en-US" dirty="0" smtClean="0">
+                <a:solidFill>
+                  <a:srgbClr val="7030A0"/>
+                </a:solidFill>
+              </a:rPr>
+              <a:t>oreach loop</a:t>
+            </a:r>
+            <a:endParaRPr lang="uk-UA" dirty="0">
+              <a:solidFill>
+                <a:srgbClr val="7030A0"/>
+              </a:solidFill>
+            </a:endParaRPr>
+          </a:p>
+        </p:txBody>
+      </p:sp>
+      <p:sp>
+        <p:nvSpPr>
+          <p:cNvPr id="6" name="Содержимое 5"/>
+          <p:cNvSpPr>
+            <a:spLocks noGrp="1"/>
+          </p:cNvSpPr>
+          <p:nvPr>
+            <p:ph sz="half" idx="2"/>
+          </p:nvPr>
+        </p:nvSpPr>
+        <p:spPr>
+          <a:xfrm>
+            <a:off x="428596" y="1214422"/>
+            <a:ext cx="8215370" cy="5072098"/>
+          </a:xfrm>
+        </p:spPr>
+        <p:style>
+          <a:lnRef idx="1">
+            <a:schemeClr val="dk1"/>
+          </a:lnRef>
+          <a:fillRef idx="2">
+            <a:schemeClr val="dk1"/>
+          </a:fillRef>
+          <a:effectRef idx="1">
+            <a:schemeClr val="dk1"/>
+          </a:effectRef>
+          <a:fontRef idx="minor">
+            <a:schemeClr val="dk1"/>
+          </a:fontRef>
+        </p:style>
+        <p:txBody>
+          <a:bodyPr>
+            <a:noAutofit/>
+          </a:bodyPr>
+          <a:lstStyle/>
+          <a:p>
+            <a:pPr>
+              <a:buNone/>
+            </a:pPr>
+            <a:r>
+              <a:rPr lang="en-US" sz="2000" b="1" dirty="0">
+                <a:latin typeface="Arial" pitchFamily="34" charset="0"/>
+                <a:cs typeface="Arial" pitchFamily="34" charset="0"/>
+              </a:rPr>
+              <a:t>import</a:t>
+            </a:r>
+            <a:r>
+              <a:rPr lang="en-US" sz="2000" dirty="0">
+                <a:latin typeface="Arial" pitchFamily="34" charset="0"/>
+                <a:cs typeface="Arial" pitchFamily="34" charset="0"/>
+              </a:rPr>
+              <a:t> java.util.*;  </a:t>
+            </a:r>
+          </a:p>
+          <a:p>
+            <a:pPr>
+              <a:buNone/>
+            </a:pPr>
+            <a:r>
+              <a:rPr lang="en-US" sz="2000" b="1" dirty="0">
+                <a:latin typeface="Arial" pitchFamily="34" charset="0"/>
+                <a:cs typeface="Arial" pitchFamily="34" charset="0"/>
+              </a:rPr>
+              <a:t>public</a:t>
+            </a:r>
+            <a:r>
+              <a:rPr lang="en-US" sz="2000" dirty="0">
+                <a:latin typeface="Arial" pitchFamily="34" charset="0"/>
+                <a:cs typeface="Arial" pitchFamily="34" charset="0"/>
+              </a:rPr>
+              <a:t> </a:t>
+            </a:r>
+            <a:r>
+              <a:rPr lang="en-US" sz="2000" b="1" dirty="0">
+                <a:latin typeface="Arial" pitchFamily="34" charset="0"/>
+                <a:cs typeface="Arial" pitchFamily="34" charset="0"/>
+              </a:rPr>
+              <a:t>class</a:t>
+            </a:r>
+            <a:r>
+              <a:rPr lang="en-US" sz="2000" dirty="0">
+                <a:latin typeface="Arial" pitchFamily="34" charset="0"/>
+                <a:cs typeface="Arial" pitchFamily="34" charset="0"/>
+              </a:rPr>
+              <a:t> LambdaExpressionExample7{  </a:t>
+            </a:r>
+          </a:p>
+          <a:p>
+            <a:pPr>
+              <a:buNone/>
+            </a:pPr>
+            <a:r>
+              <a:rPr lang="en-US" sz="2000" dirty="0">
+                <a:latin typeface="Arial" pitchFamily="34" charset="0"/>
+                <a:cs typeface="Arial" pitchFamily="34" charset="0"/>
+              </a:rPr>
+              <a:t>    </a:t>
+            </a:r>
+            <a:r>
+              <a:rPr lang="en-US" sz="2000" b="1" dirty="0">
+                <a:latin typeface="Arial" pitchFamily="34" charset="0"/>
+                <a:cs typeface="Arial" pitchFamily="34" charset="0"/>
+              </a:rPr>
+              <a:t>public</a:t>
+            </a:r>
+            <a:r>
+              <a:rPr lang="en-US" sz="2000" dirty="0">
+                <a:latin typeface="Arial" pitchFamily="34" charset="0"/>
+                <a:cs typeface="Arial" pitchFamily="34" charset="0"/>
+              </a:rPr>
+              <a:t> </a:t>
+            </a:r>
+            <a:r>
+              <a:rPr lang="en-US" sz="2000" b="1" dirty="0">
+                <a:latin typeface="Arial" pitchFamily="34" charset="0"/>
+                <a:cs typeface="Arial" pitchFamily="34" charset="0"/>
+              </a:rPr>
+              <a:t>static</a:t>
+            </a:r>
+            <a:r>
+              <a:rPr lang="en-US" sz="2000" dirty="0">
+                <a:latin typeface="Arial" pitchFamily="34" charset="0"/>
+                <a:cs typeface="Arial" pitchFamily="34" charset="0"/>
+              </a:rPr>
+              <a:t> </a:t>
+            </a:r>
+            <a:r>
+              <a:rPr lang="en-US" sz="2000" b="1" dirty="0">
+                <a:latin typeface="Arial" pitchFamily="34" charset="0"/>
+                <a:cs typeface="Arial" pitchFamily="34" charset="0"/>
+              </a:rPr>
+              <a:t>void</a:t>
+            </a:r>
+            <a:r>
+              <a:rPr lang="en-US" sz="2000" dirty="0">
+                <a:latin typeface="Arial" pitchFamily="34" charset="0"/>
+                <a:cs typeface="Arial" pitchFamily="34" charset="0"/>
+              </a:rPr>
+              <a:t> main(String[] args) {  </a:t>
+            </a:r>
+          </a:p>
+          <a:p>
+            <a:pPr>
+              <a:buNone/>
+            </a:pPr>
+            <a:r>
+              <a:rPr lang="en-US" sz="2000" dirty="0">
+                <a:latin typeface="Arial" pitchFamily="34" charset="0"/>
+                <a:cs typeface="Arial" pitchFamily="34" charset="0"/>
+              </a:rPr>
+              <a:t>          </a:t>
+            </a:r>
+          </a:p>
+          <a:p>
+            <a:pPr>
+              <a:buNone/>
+            </a:pPr>
+            <a:r>
+              <a:rPr lang="en-US" sz="2000" dirty="0">
+                <a:latin typeface="Arial" pitchFamily="34" charset="0"/>
+                <a:cs typeface="Arial" pitchFamily="34" charset="0"/>
+              </a:rPr>
+              <a:t>        List&lt;String&gt; list=</a:t>
+            </a:r>
+            <a:r>
+              <a:rPr lang="en-US" sz="2000" b="1" dirty="0">
+                <a:latin typeface="Arial" pitchFamily="34" charset="0"/>
+                <a:cs typeface="Arial" pitchFamily="34" charset="0"/>
+              </a:rPr>
+              <a:t>new</a:t>
+            </a:r>
+            <a:r>
+              <a:rPr lang="en-US" sz="2000" dirty="0">
+                <a:latin typeface="Arial" pitchFamily="34" charset="0"/>
+                <a:cs typeface="Arial" pitchFamily="34" charset="0"/>
+              </a:rPr>
+              <a:t> ArrayList&lt;String&gt;();  </a:t>
+            </a:r>
+          </a:p>
+          <a:p>
+            <a:pPr>
+              <a:buNone/>
+            </a:pPr>
+            <a:r>
+              <a:rPr lang="en-US" sz="2000" dirty="0">
+                <a:latin typeface="Arial" pitchFamily="34" charset="0"/>
+                <a:cs typeface="Arial" pitchFamily="34" charset="0"/>
+              </a:rPr>
+              <a:t>        list.add</a:t>
+            </a:r>
+            <a:r>
+              <a:rPr lang="en-US" sz="2000" dirty="0" smtClean="0">
+                <a:latin typeface="Arial" pitchFamily="34" charset="0"/>
+                <a:cs typeface="Arial" pitchFamily="34" charset="0"/>
+              </a:rPr>
+              <a:t>(“</a:t>
+            </a:r>
+            <a:r>
+              <a:rPr lang="en-US" sz="2000" dirty="0" smtClean="0">
+                <a:solidFill>
+                  <a:schemeClr val="accent5"/>
+                </a:solidFill>
+                <a:latin typeface="Arial" pitchFamily="34" charset="0"/>
+                <a:cs typeface="Arial" pitchFamily="34" charset="0"/>
+              </a:rPr>
+              <a:t>first</a:t>
+            </a:r>
+            <a:r>
+              <a:rPr lang="en-US" sz="2000" dirty="0" smtClean="0">
+                <a:latin typeface="Arial" pitchFamily="34" charset="0"/>
+                <a:cs typeface="Arial" pitchFamily="34" charset="0"/>
+              </a:rPr>
+              <a:t>");</a:t>
+            </a:r>
+            <a:r>
+              <a:rPr lang="en-US" sz="2000" dirty="0">
+                <a:latin typeface="Arial" pitchFamily="34" charset="0"/>
+                <a:cs typeface="Arial" pitchFamily="34" charset="0"/>
+              </a:rPr>
+              <a:t>  </a:t>
+            </a:r>
+          </a:p>
+          <a:p>
+            <a:pPr>
+              <a:buNone/>
+            </a:pPr>
+            <a:r>
+              <a:rPr lang="en-US" sz="2000" dirty="0">
+                <a:latin typeface="Arial" pitchFamily="34" charset="0"/>
+                <a:cs typeface="Arial" pitchFamily="34" charset="0"/>
+              </a:rPr>
+              <a:t>        list.add</a:t>
+            </a:r>
+            <a:r>
+              <a:rPr lang="en-US" sz="2000" dirty="0" smtClean="0">
+                <a:latin typeface="Arial" pitchFamily="34" charset="0"/>
+                <a:cs typeface="Arial" pitchFamily="34" charset="0"/>
+              </a:rPr>
+              <a:t>(“</a:t>
+            </a:r>
+            <a:r>
+              <a:rPr lang="en-US" sz="2000" dirty="0" smtClean="0">
+                <a:solidFill>
+                  <a:schemeClr val="accent5"/>
+                </a:solidFill>
+                <a:latin typeface="Arial" pitchFamily="34" charset="0"/>
+                <a:cs typeface="Arial" pitchFamily="34" charset="0"/>
+              </a:rPr>
+              <a:t>second</a:t>
+            </a:r>
+            <a:r>
+              <a:rPr lang="en-US" sz="2000" dirty="0" smtClean="0">
+                <a:latin typeface="Arial" pitchFamily="34" charset="0"/>
+                <a:cs typeface="Arial" pitchFamily="34" charset="0"/>
+              </a:rPr>
+              <a:t>");</a:t>
+            </a:r>
+            <a:r>
+              <a:rPr lang="en-US" sz="2000" dirty="0">
+                <a:latin typeface="Arial" pitchFamily="34" charset="0"/>
+                <a:cs typeface="Arial" pitchFamily="34" charset="0"/>
+              </a:rPr>
+              <a:t>  </a:t>
+            </a:r>
+          </a:p>
+          <a:p>
+            <a:pPr>
+              <a:buNone/>
+            </a:pPr>
+            <a:r>
+              <a:rPr lang="en-US" sz="2000" dirty="0">
+                <a:latin typeface="Arial" pitchFamily="34" charset="0"/>
+                <a:cs typeface="Arial" pitchFamily="34" charset="0"/>
+              </a:rPr>
+              <a:t>        list.add</a:t>
+            </a:r>
+            <a:r>
+              <a:rPr lang="en-US" sz="2000" dirty="0" smtClean="0">
+                <a:latin typeface="Arial" pitchFamily="34" charset="0"/>
+                <a:cs typeface="Arial" pitchFamily="34" charset="0"/>
+              </a:rPr>
+              <a:t>(“</a:t>
+            </a:r>
+            <a:r>
+              <a:rPr lang="en-US" sz="2000" dirty="0" smtClean="0">
+                <a:solidFill>
+                  <a:schemeClr val="accent5"/>
+                </a:solidFill>
+                <a:latin typeface="Arial" pitchFamily="34" charset="0"/>
+                <a:cs typeface="Arial" pitchFamily="34" charset="0"/>
+              </a:rPr>
+              <a:t>third</a:t>
+            </a:r>
+            <a:r>
+              <a:rPr lang="en-US" sz="2000" dirty="0" smtClean="0">
+                <a:latin typeface="Arial" pitchFamily="34" charset="0"/>
+                <a:cs typeface="Arial" pitchFamily="34" charset="0"/>
+              </a:rPr>
+              <a:t>");</a:t>
+            </a:r>
+            <a:r>
+              <a:rPr lang="en-US" sz="2000" dirty="0">
+                <a:latin typeface="Arial" pitchFamily="34" charset="0"/>
+                <a:cs typeface="Arial" pitchFamily="34" charset="0"/>
+              </a:rPr>
+              <a:t>    </a:t>
+            </a:r>
+          </a:p>
+          <a:p>
+            <a:pPr>
+              <a:buNone/>
+            </a:pPr>
+            <a:r>
+              <a:rPr lang="en-US" sz="2000" dirty="0">
+                <a:latin typeface="Arial" pitchFamily="34" charset="0"/>
+                <a:cs typeface="Arial" pitchFamily="34" charset="0"/>
+              </a:rPr>
+              <a:t>          </a:t>
+            </a:r>
+          </a:p>
+          <a:p>
+            <a:pPr>
+              <a:buNone/>
+            </a:pPr>
+            <a:r>
+              <a:rPr lang="en-US" sz="2000" dirty="0">
+                <a:latin typeface="Arial" pitchFamily="34" charset="0"/>
+                <a:cs typeface="Arial" pitchFamily="34" charset="0"/>
+              </a:rPr>
+              <a:t>        list.forEach</a:t>
+            </a:r>
+            <a:r>
+              <a:rPr lang="en-US" sz="2000" dirty="0" smtClean="0">
+                <a:latin typeface="Arial" pitchFamily="34" charset="0"/>
+                <a:cs typeface="Arial" pitchFamily="34" charset="0"/>
+              </a:rPr>
+              <a:t>(</a:t>
+            </a:r>
+            <a:r>
+              <a:rPr lang="en-US" sz="2000" dirty="0">
+                <a:latin typeface="Arial" pitchFamily="34" charset="0"/>
+                <a:cs typeface="Arial" pitchFamily="34" charset="0"/>
+              </a:rPr>
+              <a:t> (n</a:t>
+            </a:r>
+            <a:r>
+              <a:rPr lang="en-US" sz="2000" dirty="0" smtClean="0">
+                <a:latin typeface="Arial" pitchFamily="34" charset="0"/>
+                <a:cs typeface="Arial" pitchFamily="34" charset="0"/>
+              </a:rPr>
+              <a:t>) -&gt; System.out.println(n</a:t>
+            </a:r>
+            <a:r>
+              <a:rPr lang="en-US" sz="2000" dirty="0">
+                <a:latin typeface="Arial" pitchFamily="34" charset="0"/>
+                <a:cs typeface="Arial" pitchFamily="34" charset="0"/>
+              </a:rPr>
+              <a:t>) </a:t>
+            </a:r>
+            <a:r>
+              <a:rPr lang="en-US" sz="2000" dirty="0" smtClean="0">
+                <a:latin typeface="Arial" pitchFamily="34" charset="0"/>
+                <a:cs typeface="Arial" pitchFamily="34" charset="0"/>
+              </a:rPr>
+              <a:t>);</a:t>
+            </a:r>
+            <a:r>
+              <a:rPr lang="en-US" sz="2000" dirty="0">
+                <a:latin typeface="Arial" pitchFamily="34" charset="0"/>
+                <a:cs typeface="Arial" pitchFamily="34" charset="0"/>
+              </a:rPr>
+              <a:t>  </a:t>
+            </a:r>
+          </a:p>
+          <a:p>
+            <a:pPr>
+              <a:buNone/>
+            </a:pPr>
+            <a:r>
+              <a:rPr lang="en-US" sz="2000" dirty="0">
+                <a:latin typeface="Arial" pitchFamily="34" charset="0"/>
+                <a:cs typeface="Arial" pitchFamily="34" charset="0"/>
+              </a:rPr>
+              <a:t>    }  </a:t>
+            </a:r>
+          </a:p>
+          <a:p>
+            <a:pPr>
+              <a:buNone/>
+            </a:pPr>
+            <a:r>
+              <a:rPr lang="en-US" sz="2000" dirty="0">
+                <a:latin typeface="Arial" pitchFamily="34" charset="0"/>
+                <a:cs typeface="Arial" pitchFamily="34" charset="0"/>
+              </a:rPr>
+              <a:t>}  </a:t>
+            </a:r>
+          </a:p>
+        </p:txBody>
+      </p:sp>
+    </p:spTree>
+  </p:cSld>
+  <p:clrMapOvr>
+    <a:masterClrMapping/>
+  </p:clrMapOvr>
+</p:sld>
+</file>
+
+<file path=ppt/slides/slide12.xml><?xml version="1.0" encoding="utf-8"?>
+<p:sld xmlns:a="http://schemas.openxmlformats.org/drawingml/2006/main" xmlns:r="http://schemas.openxmlformats.org/officeDocument/2006/relationships" xmlns:p="http://schemas.openxmlformats.org/presentationml/2006/main">
+  <p:cSld>
+    <p:spTree>
+      <p:nvGrpSpPr>
+        <p:cNvPr id="1" name=""/>
+        <p:cNvGrpSpPr/>
+        <p:nvPr/>
+      </p:nvGrpSpPr>
+      <p:grpSpPr>
+        <a:xfrm>
+          <a:off x="0" y="0"/>
+          <a:ext cx="0" cy="0"/>
+          <a:chOff x="0" y="0"/>
+          <a:chExt cx="0" cy="0"/>
+        </a:xfrm>
+      </p:grpSpPr>
+      <p:sp>
+        <p:nvSpPr>
+          <p:cNvPr id="5" name="Текст 4"/>
+          <p:cNvSpPr>
+            <a:spLocks noGrp="1"/>
+          </p:cNvSpPr>
+          <p:nvPr>
+            <p:ph type="body" idx="1"/>
+          </p:nvPr>
+        </p:nvSpPr>
+        <p:spPr>
+          <a:xfrm>
+            <a:off x="2000232" y="142852"/>
+            <a:ext cx="5643602" cy="639762"/>
+          </a:xfrm>
+        </p:spPr>
+        <p:txBody>
+          <a:bodyPr>
+            <a:normAutofit fontScale="92500"/>
+          </a:bodyPr>
+          <a:lstStyle/>
+          <a:p>
+            <a:pPr algn="ctr"/>
+            <a:r>
+              <a:rPr lang="en-US" dirty="0">
+                <a:solidFill>
+                  <a:srgbClr val="7030A0"/>
+                </a:solidFill>
+              </a:rPr>
+              <a:t>L</a:t>
+            </a:r>
+            <a:r>
+              <a:rPr lang="en-US" dirty="0" smtClean="0">
+                <a:solidFill>
+                  <a:srgbClr val="7030A0"/>
+                </a:solidFill>
+              </a:rPr>
+              <a:t>ambda expression example: Creating Thread</a:t>
+            </a:r>
+            <a:endParaRPr lang="uk-UA" dirty="0">
+              <a:solidFill>
+                <a:srgbClr val="7030A0"/>
+              </a:solidFill>
+            </a:endParaRPr>
+          </a:p>
+        </p:txBody>
+      </p:sp>
+      <p:sp>
+        <p:nvSpPr>
+          <p:cNvPr id="6" name="Содержимое 5"/>
+          <p:cNvSpPr>
+            <a:spLocks noGrp="1"/>
+          </p:cNvSpPr>
+          <p:nvPr>
+            <p:ph sz="half" idx="2"/>
+          </p:nvPr>
+        </p:nvSpPr>
+        <p:spPr>
+          <a:xfrm>
+            <a:off x="428596" y="1214422"/>
+            <a:ext cx="8215370" cy="5357850"/>
+          </a:xfrm>
+        </p:spPr>
+        <p:style>
+          <a:lnRef idx="1">
+            <a:schemeClr val="dk1"/>
+          </a:lnRef>
+          <a:fillRef idx="2">
+            <a:schemeClr val="dk1"/>
+          </a:fillRef>
+          <a:effectRef idx="1">
+            <a:schemeClr val="dk1"/>
+          </a:effectRef>
+          <a:fontRef idx="minor">
+            <a:schemeClr val="dk1"/>
+          </a:fontRef>
+        </p:style>
+        <p:txBody>
+          <a:bodyPr>
+            <a:noAutofit/>
+          </a:bodyPr>
+          <a:lstStyle/>
+          <a:p>
+            <a:pPr>
+              <a:buNone/>
+            </a:pPr>
+            <a:r>
+              <a:rPr lang="en-US" sz="2000" dirty="0">
+                <a:latin typeface="Arial" pitchFamily="34" charset="0"/>
+                <a:cs typeface="Arial" pitchFamily="34" charset="0"/>
+              </a:rPr>
+              <a:t> </a:t>
+            </a:r>
+            <a:r>
+              <a:rPr lang="en-US" sz="2000" dirty="0">
+                <a:solidFill>
+                  <a:srgbClr val="00B050"/>
+                </a:solidFill>
+                <a:latin typeface="Arial" pitchFamily="34" charset="0"/>
+                <a:cs typeface="Arial" pitchFamily="34" charset="0"/>
+              </a:rPr>
+              <a:t>//Thread Example without lambda</a:t>
+            </a:r>
+            <a:r>
+              <a:rPr lang="en-US" sz="2000" dirty="0">
+                <a:latin typeface="Arial" pitchFamily="34" charset="0"/>
+                <a:cs typeface="Arial" pitchFamily="34" charset="0"/>
+              </a:rPr>
+              <a:t>  </a:t>
+            </a:r>
+          </a:p>
+          <a:p>
+            <a:pPr>
+              <a:buNone/>
+            </a:pPr>
+            <a:r>
+              <a:rPr lang="en-US" sz="2000" dirty="0">
+                <a:latin typeface="Arial" pitchFamily="34" charset="0"/>
+                <a:cs typeface="Arial" pitchFamily="34" charset="0"/>
+              </a:rPr>
+              <a:t>        Runnable r1=</a:t>
+            </a:r>
+            <a:r>
+              <a:rPr lang="en-US" sz="2000" b="1" dirty="0">
+                <a:latin typeface="Arial" pitchFamily="34" charset="0"/>
+                <a:cs typeface="Arial" pitchFamily="34" charset="0"/>
+              </a:rPr>
+              <a:t>new</a:t>
+            </a:r>
+            <a:r>
+              <a:rPr lang="en-US" sz="2000" dirty="0">
+                <a:latin typeface="Arial" pitchFamily="34" charset="0"/>
+                <a:cs typeface="Arial" pitchFamily="34" charset="0"/>
+              </a:rPr>
+              <a:t> Runnable(){  </a:t>
+            </a:r>
+          </a:p>
+          <a:p>
+            <a:pPr>
+              <a:buNone/>
+            </a:pPr>
+            <a:r>
+              <a:rPr lang="en-US" sz="2000" dirty="0">
+                <a:latin typeface="Arial" pitchFamily="34" charset="0"/>
+                <a:cs typeface="Arial" pitchFamily="34" charset="0"/>
+              </a:rPr>
+              <a:t>            </a:t>
+            </a:r>
+            <a:r>
+              <a:rPr lang="en-US" sz="2000" b="1" dirty="0">
+                <a:latin typeface="Arial" pitchFamily="34" charset="0"/>
+                <a:cs typeface="Arial" pitchFamily="34" charset="0"/>
+              </a:rPr>
+              <a:t>public</a:t>
+            </a:r>
+            <a:r>
+              <a:rPr lang="en-US" sz="2000" dirty="0">
+                <a:latin typeface="Arial" pitchFamily="34" charset="0"/>
+                <a:cs typeface="Arial" pitchFamily="34" charset="0"/>
+              </a:rPr>
+              <a:t> </a:t>
+            </a:r>
+            <a:r>
+              <a:rPr lang="en-US" sz="2000" b="1" dirty="0">
+                <a:latin typeface="Arial" pitchFamily="34" charset="0"/>
+                <a:cs typeface="Arial" pitchFamily="34" charset="0"/>
+              </a:rPr>
+              <a:t>void</a:t>
+            </a:r>
+            <a:r>
+              <a:rPr lang="en-US" sz="2000" dirty="0">
+                <a:latin typeface="Arial" pitchFamily="34" charset="0"/>
+                <a:cs typeface="Arial" pitchFamily="34" charset="0"/>
+              </a:rPr>
+              <a:t> run(){  </a:t>
+            </a:r>
+          </a:p>
+          <a:p>
+            <a:pPr>
+              <a:buNone/>
+            </a:pPr>
+            <a:r>
+              <a:rPr lang="en-US" sz="2000" dirty="0">
+                <a:latin typeface="Arial" pitchFamily="34" charset="0"/>
+                <a:cs typeface="Arial" pitchFamily="34" charset="0"/>
+              </a:rPr>
+              <a:t>                System.out.println("Thread1 is running...");  </a:t>
+            </a:r>
+          </a:p>
+          <a:p>
+            <a:pPr>
+              <a:buNone/>
+            </a:pPr>
+            <a:r>
+              <a:rPr lang="en-US" sz="2000" dirty="0">
+                <a:latin typeface="Arial" pitchFamily="34" charset="0"/>
+                <a:cs typeface="Arial" pitchFamily="34" charset="0"/>
+              </a:rPr>
+              <a:t>            }  </a:t>
+            </a:r>
+          </a:p>
+          <a:p>
+            <a:pPr>
+              <a:buNone/>
+            </a:pPr>
+            <a:r>
+              <a:rPr lang="en-US" sz="2000" dirty="0">
+                <a:latin typeface="Arial" pitchFamily="34" charset="0"/>
+                <a:cs typeface="Arial" pitchFamily="34" charset="0"/>
+              </a:rPr>
+              <a:t>        };  </a:t>
+            </a:r>
+          </a:p>
+          <a:p>
+            <a:pPr>
+              <a:buNone/>
+            </a:pPr>
+            <a:r>
+              <a:rPr lang="en-US" sz="2000" dirty="0">
+                <a:latin typeface="Arial" pitchFamily="34" charset="0"/>
+                <a:cs typeface="Arial" pitchFamily="34" charset="0"/>
+              </a:rPr>
+              <a:t>        Thread t1=</a:t>
+            </a:r>
+            <a:r>
+              <a:rPr lang="en-US" sz="2000" b="1" dirty="0">
+                <a:latin typeface="Arial" pitchFamily="34" charset="0"/>
+                <a:cs typeface="Arial" pitchFamily="34" charset="0"/>
+              </a:rPr>
+              <a:t>new</a:t>
+            </a:r>
+            <a:r>
+              <a:rPr lang="en-US" sz="2000" dirty="0">
+                <a:latin typeface="Arial" pitchFamily="34" charset="0"/>
+                <a:cs typeface="Arial" pitchFamily="34" charset="0"/>
+              </a:rPr>
+              <a:t> Thread(r1);  </a:t>
+            </a:r>
+          </a:p>
+          <a:p>
+            <a:pPr>
+              <a:buNone/>
+            </a:pPr>
+            <a:r>
+              <a:rPr lang="en-US" sz="2000" dirty="0">
+                <a:latin typeface="Arial" pitchFamily="34" charset="0"/>
+                <a:cs typeface="Arial" pitchFamily="34" charset="0"/>
+              </a:rPr>
+              <a:t>        t1.start();  </a:t>
+            </a:r>
+          </a:p>
+          <a:p>
+            <a:pPr>
+              <a:buNone/>
+            </a:pPr>
+            <a:r>
+              <a:rPr lang="en-US" sz="2000" dirty="0">
+                <a:latin typeface="Arial" pitchFamily="34" charset="0"/>
+                <a:cs typeface="Arial" pitchFamily="34" charset="0"/>
+              </a:rPr>
+              <a:t>        </a:t>
+            </a:r>
+            <a:r>
+              <a:rPr lang="en-US" sz="2000" dirty="0">
+                <a:solidFill>
+                  <a:srgbClr val="00B050"/>
+                </a:solidFill>
+                <a:latin typeface="Arial" pitchFamily="34" charset="0"/>
+                <a:cs typeface="Arial" pitchFamily="34" charset="0"/>
+              </a:rPr>
+              <a:t>//Thread Example with lambda</a:t>
+            </a:r>
+            <a:r>
+              <a:rPr lang="en-US" sz="2000" dirty="0">
+                <a:latin typeface="Arial" pitchFamily="34" charset="0"/>
+                <a:cs typeface="Arial" pitchFamily="34" charset="0"/>
+              </a:rPr>
+              <a:t>  </a:t>
+            </a:r>
+          </a:p>
+          <a:p>
+            <a:pPr>
+              <a:buNone/>
+            </a:pPr>
+            <a:r>
+              <a:rPr lang="en-US" sz="2000" dirty="0">
+                <a:latin typeface="Arial" pitchFamily="34" charset="0"/>
+                <a:cs typeface="Arial" pitchFamily="34" charset="0"/>
+              </a:rPr>
+              <a:t>        Runnable r2=()-&gt;{  </a:t>
+            </a:r>
+          </a:p>
+          <a:p>
+            <a:pPr>
+              <a:buNone/>
+            </a:pPr>
+            <a:r>
+              <a:rPr lang="en-US" sz="2000" dirty="0">
+                <a:latin typeface="Arial" pitchFamily="34" charset="0"/>
+                <a:cs typeface="Arial" pitchFamily="34" charset="0"/>
+              </a:rPr>
+              <a:t>                System.out.println("Thread2 is running...");  </a:t>
+            </a:r>
+          </a:p>
+          <a:p>
+            <a:pPr>
+              <a:buNone/>
+            </a:pPr>
+            <a:r>
+              <a:rPr lang="en-US" sz="2000" dirty="0">
+                <a:latin typeface="Arial" pitchFamily="34" charset="0"/>
+                <a:cs typeface="Arial" pitchFamily="34" charset="0"/>
+              </a:rPr>
+              <a:t>        };  </a:t>
+            </a:r>
+          </a:p>
+          <a:p>
+            <a:pPr>
+              <a:buNone/>
+            </a:pPr>
+            <a:r>
+              <a:rPr lang="en-US" sz="2000" dirty="0">
+                <a:latin typeface="Arial" pitchFamily="34" charset="0"/>
+                <a:cs typeface="Arial" pitchFamily="34" charset="0"/>
+              </a:rPr>
+              <a:t>        Thread t2=</a:t>
+            </a:r>
+            <a:r>
+              <a:rPr lang="en-US" sz="2000" b="1" dirty="0">
+                <a:latin typeface="Arial" pitchFamily="34" charset="0"/>
+                <a:cs typeface="Arial" pitchFamily="34" charset="0"/>
+              </a:rPr>
+              <a:t>new</a:t>
+            </a:r>
+            <a:r>
+              <a:rPr lang="en-US" sz="2000" dirty="0">
+                <a:latin typeface="Arial" pitchFamily="34" charset="0"/>
+                <a:cs typeface="Arial" pitchFamily="34" charset="0"/>
+              </a:rPr>
+              <a:t> Thread(r2);  </a:t>
+            </a:r>
+          </a:p>
+          <a:p>
+            <a:pPr>
+              <a:buNone/>
+            </a:pPr>
+            <a:r>
+              <a:rPr lang="en-US" sz="2000" dirty="0">
+                <a:latin typeface="Arial" pitchFamily="34" charset="0"/>
+                <a:cs typeface="Arial" pitchFamily="34" charset="0"/>
+              </a:rPr>
+              <a:t>        t2.start();  </a:t>
             </a:r>
           </a:p>
         </p:txBody>

</xml_diff>